<commit_message>
Readme and updated notes
</commit_message>
<xml_diff>
--- a/notes.pptx
+++ b/notes.pptx
@@ -5,21 +5,22 @@
     <p:sldMasterId id="2147483648" r:id="rId1"/>
   </p:sldMasterIdLst>
   <p:notesMasterIdLst>
-    <p:notesMasterId r:id="rId14"/>
+    <p:notesMasterId r:id="rId15"/>
   </p:notesMasterIdLst>
   <p:sldIdLst>
     <p:sldId id="256" r:id="rId2"/>
     <p:sldId id="268" r:id="rId3"/>
     <p:sldId id="278" r:id="rId4"/>
     <p:sldId id="277" r:id="rId5"/>
-    <p:sldId id="270" r:id="rId6"/>
-    <p:sldId id="271" r:id="rId7"/>
-    <p:sldId id="272" r:id="rId8"/>
-    <p:sldId id="273" r:id="rId9"/>
-    <p:sldId id="274" r:id="rId10"/>
-    <p:sldId id="275" r:id="rId11"/>
-    <p:sldId id="260" r:id="rId12"/>
-    <p:sldId id="262" r:id="rId13"/>
+    <p:sldId id="279" r:id="rId6"/>
+    <p:sldId id="270" r:id="rId7"/>
+    <p:sldId id="271" r:id="rId8"/>
+    <p:sldId id="272" r:id="rId9"/>
+    <p:sldId id="273" r:id="rId10"/>
+    <p:sldId id="274" r:id="rId11"/>
+    <p:sldId id="275" r:id="rId12"/>
+    <p:sldId id="260" r:id="rId13"/>
+    <p:sldId id="262" r:id="rId14"/>
   </p:sldIdLst>
   <p:sldSz cx="12192000" cy="6858000"/>
   <p:notesSz cx="6858000" cy="9144000"/>
@@ -227,7 +228,7 @@
           <a:p>
             <a:fld id="{818EDC40-6AF4-4983-959F-ADE1AB5153F8}" type="datetimeFigureOut">
               <a:rPr lang="en-GB" smtClean="0"/>
-              <a:t>27/12/2019</a:t>
+              <a:t>30/12/2019</a:t>
             </a:fld>
             <a:endParaRPr lang="en-GB"/>
           </a:p>
@@ -647,7 +648,7 @@
           <a:p>
             <a:fld id="{C96D5B05-480A-40F4-9E30-14B11DEC835E}" type="slidenum">
               <a:rPr lang="en-GB" smtClean="0"/>
-              <a:t>11</a:t>
+              <a:t>12</a:t>
             </a:fld>
             <a:endParaRPr lang="en-GB"/>
           </a:p>
@@ -731,7 +732,7 @@
           <a:p>
             <a:fld id="{C96D5B05-480A-40F4-9E30-14B11DEC835E}" type="slidenum">
               <a:rPr lang="en-GB" smtClean="0"/>
-              <a:t>12</a:t>
+              <a:t>13</a:t>
             </a:fld>
             <a:endParaRPr lang="en-GB"/>
           </a:p>
@@ -881,7 +882,7 @@
           <a:p>
             <a:fld id="{5F240B16-69E4-4A48-8336-B6AB43F9EE55}" type="datetime1">
               <a:rPr lang="en-GB" smtClean="0"/>
-              <a:t>27/12/2019</a:t>
+              <a:t>30/12/2019</a:t>
             </a:fld>
             <a:endParaRPr lang="en-GB"/>
           </a:p>
@@ -1055,7 +1056,7 @@
           <a:p>
             <a:fld id="{1140E01A-D2E7-4E70-A11A-1228FF2A0076}" type="datetime1">
               <a:rPr lang="en-GB" smtClean="0"/>
-              <a:t>27/12/2019</a:t>
+              <a:t>30/12/2019</a:t>
             </a:fld>
             <a:endParaRPr lang="en-GB"/>
           </a:p>
@@ -1239,7 +1240,7 @@
           <a:p>
             <a:fld id="{6CC5B6B8-A2AC-4300-B149-4A64EDA35060}" type="datetime1">
               <a:rPr lang="en-GB" smtClean="0"/>
-              <a:t>27/12/2019</a:t>
+              <a:t>30/12/2019</a:t>
             </a:fld>
             <a:endParaRPr lang="en-GB"/>
           </a:p>
@@ -1413,7 +1414,7 @@
           <a:p>
             <a:fld id="{57050878-92A7-4B6E-8BDD-28D138ABD5BD}" type="datetime1">
               <a:rPr lang="en-GB" smtClean="0"/>
-              <a:t>27/12/2019</a:t>
+              <a:t>30/12/2019</a:t>
             </a:fld>
             <a:endParaRPr lang="en-GB"/>
           </a:p>
@@ -1663,7 +1664,7 @@
           <a:p>
             <a:fld id="{10F8FE08-1F00-4F76-A634-6BFFF32A4D06}" type="datetime1">
               <a:rPr lang="en-GB" smtClean="0"/>
-              <a:t>27/12/2019</a:t>
+              <a:t>30/12/2019</a:t>
             </a:fld>
             <a:endParaRPr lang="en-GB"/>
           </a:p>
@@ -1899,7 +1900,7 @@
           <a:p>
             <a:fld id="{1F760AEC-14BB-44ED-8304-509E6A957805}" type="datetime1">
               <a:rPr lang="en-GB" smtClean="0"/>
-              <a:t>27/12/2019</a:t>
+              <a:t>30/12/2019</a:t>
             </a:fld>
             <a:endParaRPr lang="en-GB"/>
           </a:p>
@@ -2270,7 +2271,7 @@
           <a:p>
             <a:fld id="{F5210B06-AC59-4167-A147-8A97CE6BC2A6}" type="datetime1">
               <a:rPr lang="en-GB" smtClean="0"/>
-              <a:t>27/12/2019</a:t>
+              <a:t>30/12/2019</a:t>
             </a:fld>
             <a:endParaRPr lang="en-GB"/>
           </a:p>
@@ -2392,7 +2393,7 @@
           <a:p>
             <a:fld id="{B9F3A15F-80E2-4C2A-A6A8-164AD11C1EE4}" type="datetime1">
               <a:rPr lang="en-GB" smtClean="0"/>
-              <a:t>27/12/2019</a:t>
+              <a:t>30/12/2019</a:t>
             </a:fld>
             <a:endParaRPr lang="en-GB"/>
           </a:p>
@@ -2491,7 +2492,7 @@
           <a:p>
             <a:fld id="{540198BE-1545-4657-AD74-7628865DBD85}" type="datetime1">
               <a:rPr lang="en-GB" smtClean="0"/>
-              <a:t>27/12/2019</a:t>
+              <a:t>30/12/2019</a:t>
             </a:fld>
             <a:endParaRPr lang="en-GB"/>
           </a:p>
@@ -2772,7 +2773,7 @@
           <a:p>
             <a:fld id="{C0DBC7E1-0CA3-4EC6-9AA6-AAD8B9841CFA}" type="datetime1">
               <a:rPr lang="en-GB" smtClean="0"/>
-              <a:t>27/12/2019</a:t>
+              <a:t>30/12/2019</a:t>
             </a:fld>
             <a:endParaRPr lang="en-GB"/>
           </a:p>
@@ -3029,7 +3030,7 @@
           <a:p>
             <a:fld id="{41B21F39-D3AF-41D3-B445-34FF22CB0F33}" type="datetime1">
               <a:rPr lang="en-GB" smtClean="0"/>
-              <a:t>27/12/2019</a:t>
+              <a:t>30/12/2019</a:t>
             </a:fld>
             <a:endParaRPr lang="en-GB"/>
           </a:p>
@@ -3246,7 +3247,7 @@
           <a:p>
             <a:fld id="{22E8752F-2FBA-4EDF-B776-68C569AE8FB7}" type="datetime1">
               <a:rPr lang="en-GB" smtClean="0"/>
-              <a:t>27/12/2019</a:t>
+              <a:t>30/12/2019</a:t>
             </a:fld>
             <a:endParaRPr lang="en-GB"/>
           </a:p>
@@ -4415,7 +4416,7 @@
     </p:spTree>
     <p:extLst>
       <p:ext uri="{BB962C8B-B14F-4D97-AF65-F5344CB8AC3E}">
-        <p14:creationId xmlns:p14="http://schemas.microsoft.com/office/powerpoint/2010/main" val="3353978972"/>
+        <p14:creationId xmlns:p14="http://schemas.microsoft.com/office/powerpoint/2010/main" val="1509430587"/>
       </p:ext>
     </p:extLst>
   </p:cSld>
@@ -4444,7 +4445,13 @@
       </p:grpSpPr>
       <p:sp>
         <p:nvSpPr>
-          <p:cNvPr id="2" name="Title 1"/>
+          <p:cNvPr id="2" name="Title 1">
+            <a:extLst>
+              <a:ext uri="{FF2B5EF4-FFF2-40B4-BE49-F238E27FC236}">
+                <a16:creationId xmlns:a16="http://schemas.microsoft.com/office/drawing/2014/main" id="{CE9D39DE-58E4-4F7D-BFFF-ABCD3F80F6C0}"/>
+              </a:ext>
+            </a:extLst>
+          </p:cNvPr>
           <p:cNvSpPr>
             <a:spLocks noGrp="1"/>
           </p:cNvSpPr>
@@ -4454,66 +4461,542 @@
         </p:nvSpPr>
         <p:spPr>
           <a:xfrm>
-            <a:off x="241041" y="247126"/>
-            <a:ext cx="10515600" cy="1325563"/>
+            <a:off x="839788" y="365126"/>
+            <a:ext cx="10439400" cy="747238"/>
           </a:xfrm>
         </p:spPr>
         <p:txBody>
+          <a:bodyPr>
+            <a:normAutofit/>
+          </a:bodyPr>
+          <a:lstStyle/>
+          <a:p>
+            <a:endParaRPr lang="en-GB" sz="2400" b="1" dirty="0">
+              <a:solidFill>
+                <a:srgbClr val="C00000"/>
+              </a:solidFill>
+              <a:latin typeface="Arial" panose="020B0604020202020204" pitchFamily="34" charset="0"/>
+              <a:ea typeface="+mn-ea"/>
+              <a:cs typeface="Arial" panose="020B0604020202020204" pitchFamily="34" charset="0"/>
+            </a:endParaRPr>
+          </a:p>
+        </p:txBody>
+      </p:sp>
+      <p:sp>
+        <p:nvSpPr>
+          <p:cNvPr id="3" name="Text Placeholder 2">
+            <a:extLst>
+              <a:ext uri="{FF2B5EF4-FFF2-40B4-BE49-F238E27FC236}">
+                <a16:creationId xmlns:a16="http://schemas.microsoft.com/office/drawing/2014/main" id="{B7946FBB-E702-40DD-BB5B-F596FD4134C4}"/>
+              </a:ext>
+            </a:extLst>
+          </p:cNvPr>
+          <p:cNvSpPr>
+            <a:spLocks noGrp="1"/>
+          </p:cNvSpPr>
+          <p:nvPr>
+            <p:ph type="body" idx="1"/>
+          </p:nvPr>
+        </p:nvSpPr>
+        <p:spPr>
+          <a:xfrm>
+            <a:off x="836612" y="1185864"/>
+            <a:ext cx="5157787" cy="823912"/>
+          </a:xfrm>
+        </p:spPr>
+        <p:txBody>
+          <a:bodyPr>
+            <a:normAutofit/>
+          </a:bodyPr>
+          <a:lstStyle/>
+          <a:p>
+            <a:endParaRPr lang="en-GB" sz="1800" dirty="0">
+              <a:solidFill>
+                <a:srgbClr val="C00000"/>
+              </a:solidFill>
+              <a:latin typeface="Arial" panose="020B0604020202020204" pitchFamily="34" charset="0"/>
+              <a:cs typeface="Arial" panose="020B0604020202020204" pitchFamily="34" charset="0"/>
+            </a:endParaRPr>
+          </a:p>
+        </p:txBody>
+      </p:sp>
+      <p:sp>
+        <p:nvSpPr>
+          <p:cNvPr id="4" name="Content Placeholder 3">
+            <a:extLst>
+              <a:ext uri="{FF2B5EF4-FFF2-40B4-BE49-F238E27FC236}">
+                <a16:creationId xmlns:a16="http://schemas.microsoft.com/office/drawing/2014/main" id="{2A72F672-450E-4C75-8312-350C0A1FC667}"/>
+              </a:ext>
+            </a:extLst>
+          </p:cNvPr>
+          <p:cNvSpPr>
+            <a:spLocks noGrp="1"/>
+          </p:cNvSpPr>
+          <p:nvPr>
+            <p:ph sz="half" idx="2"/>
+          </p:nvPr>
+        </p:nvSpPr>
+        <p:spPr>
+          <a:xfrm>
+            <a:off x="839788" y="2083276"/>
+            <a:ext cx="5157787" cy="4106387"/>
+          </a:xfrm>
+        </p:spPr>
+        <p:txBody>
+          <a:bodyPr>
+            <a:normAutofit/>
+          </a:bodyPr>
+          <a:lstStyle/>
+          <a:p>
+            <a:pPr>
+              <a:buFont typeface="Wingdings" panose="05000000000000000000" pitchFamily="2" charset="2"/>
+              <a:buChar char="§"/>
+            </a:pPr>
+            <a:r>
+              <a:rPr lang="en-GB" sz="1400" dirty="0">
+                <a:latin typeface="Arial" panose="020B0604020202020204" pitchFamily="34" charset="0"/>
+                <a:cs typeface="Arial" panose="020B0604020202020204" pitchFamily="34" charset="0"/>
+              </a:rPr>
+              <a:t>Dd</a:t>
+            </a:r>
+          </a:p>
+          <a:p>
+            <a:pPr>
+              <a:buFont typeface="Wingdings" panose="05000000000000000000" pitchFamily="2" charset="2"/>
+              <a:buChar char="§"/>
+            </a:pPr>
+            <a:endParaRPr lang="en-GB" sz="1400" dirty="0">
+              <a:latin typeface="Arial" panose="020B0604020202020204" pitchFamily="34" charset="0"/>
+              <a:cs typeface="Arial" panose="020B0604020202020204" pitchFamily="34" charset="0"/>
+            </a:endParaRPr>
+          </a:p>
+          <a:p>
+            <a:pPr>
+              <a:buFont typeface="Wingdings" panose="05000000000000000000" pitchFamily="2" charset="2"/>
+              <a:buChar char="§"/>
+            </a:pPr>
+            <a:endParaRPr lang="en-GB" sz="1400" dirty="0">
+              <a:latin typeface="Arial" panose="020B0604020202020204" pitchFamily="34" charset="0"/>
+              <a:cs typeface="Arial" panose="020B0604020202020204" pitchFamily="34" charset="0"/>
+            </a:endParaRPr>
+          </a:p>
+          <a:p>
+            <a:pPr>
+              <a:buFont typeface="Wingdings" panose="05000000000000000000" pitchFamily="2" charset="2"/>
+              <a:buChar char="§"/>
+            </a:pPr>
+            <a:endParaRPr lang="en-GB" sz="1400" dirty="0">
+              <a:latin typeface="Arial" panose="020B0604020202020204" pitchFamily="34" charset="0"/>
+              <a:cs typeface="Arial" panose="020B0604020202020204" pitchFamily="34" charset="0"/>
+            </a:endParaRPr>
+          </a:p>
+          <a:p>
+            <a:pPr>
+              <a:buFont typeface="Wingdings" panose="05000000000000000000" pitchFamily="2" charset="2"/>
+              <a:buChar char="§"/>
+            </a:pPr>
+            <a:endParaRPr lang="en-GB" sz="1400" dirty="0">
+              <a:latin typeface="Arial" panose="020B0604020202020204" pitchFamily="34" charset="0"/>
+              <a:cs typeface="Arial" panose="020B0604020202020204" pitchFamily="34" charset="0"/>
+            </a:endParaRPr>
+          </a:p>
+          <a:p>
+            <a:pPr>
+              <a:buFont typeface="Wingdings" panose="05000000000000000000" pitchFamily="2" charset="2"/>
+              <a:buChar char="§"/>
+            </a:pPr>
+            <a:endParaRPr lang="en-GB" sz="1400" dirty="0">
+              <a:latin typeface="Arial" panose="020B0604020202020204" pitchFamily="34" charset="0"/>
+              <a:cs typeface="Arial" panose="020B0604020202020204" pitchFamily="34" charset="0"/>
+            </a:endParaRPr>
+          </a:p>
+          <a:p>
+            <a:pPr>
+              <a:buFont typeface="Wingdings" panose="05000000000000000000" pitchFamily="2" charset="2"/>
+              <a:buChar char="§"/>
+            </a:pPr>
+            <a:endParaRPr lang="en-GB" sz="1400" dirty="0">
+              <a:latin typeface="Arial" panose="020B0604020202020204" pitchFamily="34" charset="0"/>
+              <a:cs typeface="Arial" panose="020B0604020202020204" pitchFamily="34" charset="0"/>
+            </a:endParaRPr>
+          </a:p>
+          <a:p>
+            <a:pPr>
+              <a:buFont typeface="Wingdings" panose="05000000000000000000" pitchFamily="2" charset="2"/>
+              <a:buChar char="§"/>
+            </a:pPr>
+            <a:endParaRPr lang="en-GB" sz="1400" dirty="0">
+              <a:latin typeface="Arial" panose="020B0604020202020204" pitchFamily="34" charset="0"/>
+              <a:cs typeface="Arial" panose="020B0604020202020204" pitchFamily="34" charset="0"/>
+            </a:endParaRPr>
+          </a:p>
+          <a:p>
+            <a:pPr>
+              <a:buFont typeface="Wingdings" panose="05000000000000000000" pitchFamily="2" charset="2"/>
+              <a:buChar char="§"/>
+            </a:pPr>
+            <a:endParaRPr lang="en-GB" sz="1400" dirty="0">
+              <a:latin typeface="Arial" panose="020B0604020202020204" pitchFamily="34" charset="0"/>
+              <a:cs typeface="Arial" panose="020B0604020202020204" pitchFamily="34" charset="0"/>
+            </a:endParaRPr>
+          </a:p>
+          <a:p>
+            <a:pPr>
+              <a:buFont typeface="Wingdings" panose="05000000000000000000" pitchFamily="2" charset="2"/>
+              <a:buChar char="§"/>
+            </a:pPr>
+            <a:endParaRPr lang="en-GB" sz="1400" dirty="0">
+              <a:latin typeface="Arial" panose="020B0604020202020204" pitchFamily="34" charset="0"/>
+              <a:cs typeface="Arial" panose="020B0604020202020204" pitchFamily="34" charset="0"/>
+            </a:endParaRPr>
+          </a:p>
+          <a:p>
+            <a:pPr>
+              <a:buFont typeface="Wingdings" panose="05000000000000000000" pitchFamily="2" charset="2"/>
+              <a:buChar char="§"/>
+            </a:pPr>
+            <a:endParaRPr lang="en-GB" sz="1400" dirty="0">
+              <a:latin typeface="Arial" panose="020B0604020202020204" pitchFamily="34" charset="0"/>
+              <a:cs typeface="Arial" panose="020B0604020202020204" pitchFamily="34" charset="0"/>
+            </a:endParaRPr>
+          </a:p>
+          <a:p>
+            <a:pPr>
+              <a:buFont typeface="Wingdings" panose="05000000000000000000" pitchFamily="2" charset="2"/>
+              <a:buChar char="§"/>
+            </a:pPr>
+            <a:endParaRPr lang="en-GB" sz="1400" dirty="0">
+              <a:latin typeface="Arial" panose="020B0604020202020204" pitchFamily="34" charset="0"/>
+              <a:cs typeface="Arial" panose="020B0604020202020204" pitchFamily="34" charset="0"/>
+            </a:endParaRPr>
+          </a:p>
+          <a:p>
+            <a:pPr>
+              <a:buFont typeface="Wingdings" panose="05000000000000000000" pitchFamily="2" charset="2"/>
+              <a:buChar char="§"/>
+            </a:pPr>
+            <a:endParaRPr lang="en-GB" sz="1400" dirty="0">
+              <a:latin typeface="Arial" panose="020B0604020202020204" pitchFamily="34" charset="0"/>
+              <a:cs typeface="Arial" panose="020B0604020202020204" pitchFamily="34" charset="0"/>
+            </a:endParaRPr>
+          </a:p>
+          <a:p>
+            <a:pPr>
+              <a:buFont typeface="Wingdings" panose="05000000000000000000" pitchFamily="2" charset="2"/>
+              <a:buChar char="§"/>
+            </a:pPr>
+            <a:endParaRPr lang="en-GB" sz="1400" dirty="0">
+              <a:latin typeface="Arial" panose="020B0604020202020204" pitchFamily="34" charset="0"/>
+              <a:cs typeface="Arial" panose="020B0604020202020204" pitchFamily="34" charset="0"/>
+            </a:endParaRPr>
+          </a:p>
+          <a:p>
+            <a:pPr>
+              <a:buFont typeface="Wingdings" panose="05000000000000000000" pitchFamily="2" charset="2"/>
+              <a:buChar char="§"/>
+            </a:pPr>
+            <a:endParaRPr lang="en-GB" sz="1400" dirty="0">
+              <a:latin typeface="Arial" panose="020B0604020202020204" pitchFamily="34" charset="0"/>
+              <a:cs typeface="Arial" panose="020B0604020202020204" pitchFamily="34" charset="0"/>
+            </a:endParaRPr>
+          </a:p>
+          <a:p>
+            <a:pPr>
+              <a:buFont typeface="Wingdings" panose="05000000000000000000" pitchFamily="2" charset="2"/>
+              <a:buChar char="§"/>
+            </a:pPr>
+            <a:endParaRPr lang="en-GB" sz="1400" dirty="0">
+              <a:latin typeface="Arial" panose="020B0604020202020204" pitchFamily="34" charset="0"/>
+              <a:cs typeface="Arial" panose="020B0604020202020204" pitchFamily="34" charset="0"/>
+            </a:endParaRPr>
+          </a:p>
+        </p:txBody>
+      </p:sp>
+      <p:sp>
+        <p:nvSpPr>
+          <p:cNvPr id="5" name="Text Placeholder 4">
+            <a:extLst>
+              <a:ext uri="{FF2B5EF4-FFF2-40B4-BE49-F238E27FC236}">
+                <a16:creationId xmlns:a16="http://schemas.microsoft.com/office/drawing/2014/main" id="{ABD8EA33-90C7-49EC-BD42-E56F826088E4}"/>
+              </a:ext>
+            </a:extLst>
+          </p:cNvPr>
+          <p:cNvSpPr>
+            <a:spLocks noGrp="1"/>
+          </p:cNvSpPr>
+          <p:nvPr>
+            <p:ph type="body" sz="quarter" idx="3"/>
+          </p:nvPr>
+        </p:nvSpPr>
+        <p:spPr>
+          <a:xfrm>
+            <a:off x="6096000" y="1185864"/>
+            <a:ext cx="5183188" cy="823912"/>
+          </a:xfrm>
+        </p:spPr>
+        <p:txBody>
+          <a:bodyPr>
+            <a:normAutofit/>
+          </a:bodyPr>
+          <a:lstStyle/>
+          <a:p>
+            <a:endParaRPr lang="en-GB" sz="1800" dirty="0">
+              <a:solidFill>
+                <a:srgbClr val="C00000"/>
+              </a:solidFill>
+              <a:latin typeface="Arial" panose="020B0604020202020204" pitchFamily="34" charset="0"/>
+              <a:cs typeface="Arial" panose="020B0604020202020204" pitchFamily="34" charset="0"/>
+            </a:endParaRPr>
+          </a:p>
+        </p:txBody>
+      </p:sp>
+      <p:sp>
+        <p:nvSpPr>
+          <p:cNvPr id="6" name="Content Placeholder 5">
+            <a:extLst>
+              <a:ext uri="{FF2B5EF4-FFF2-40B4-BE49-F238E27FC236}">
+                <a16:creationId xmlns:a16="http://schemas.microsoft.com/office/drawing/2014/main" id="{AD116E6F-291D-4E83-B76F-21B92067EC07}"/>
+              </a:ext>
+            </a:extLst>
+          </p:cNvPr>
+          <p:cNvSpPr>
+            <a:spLocks noGrp="1"/>
+          </p:cNvSpPr>
+          <p:nvPr>
+            <p:ph sz="quarter" idx="4"/>
+          </p:nvPr>
+        </p:nvSpPr>
+        <p:spPr>
+          <a:xfrm>
+            <a:off x="6096000" y="2083276"/>
+            <a:ext cx="5183188" cy="4106387"/>
+          </a:xfrm>
+        </p:spPr>
+        <p:txBody>
           <a:bodyPr/>
           <a:lstStyle/>
           <a:p>
-            <a:r>
-              <a:rPr lang="en-GB" dirty="0">
+            <a:pPr lvl="0">
+              <a:buFont typeface="Wingdings" panose="05000000000000000000" pitchFamily="2" charset="2"/>
+              <a:buChar char="§"/>
+            </a:pPr>
+            <a:r>
+              <a:rPr lang="en-GB" sz="1400" dirty="0">
                 <a:solidFill>
-                  <a:srgbClr val="C00000"/>
+                  <a:prstClr val="black"/>
                 </a:solidFill>
                 <a:latin typeface="Arial" panose="020B0604020202020204" pitchFamily="34" charset="0"/>
                 <a:cs typeface="Arial" panose="020B0604020202020204" pitchFamily="34" charset="0"/>
               </a:rPr>
-              <a:t>WHY a good opportunity?</a:t>
-            </a:r>
-          </a:p>
-        </p:txBody>
-      </p:sp>
-      <p:sp>
-        <p:nvSpPr>
-          <p:cNvPr id="3" name="Content Placeholder 2"/>
-          <p:cNvSpPr>
-            <a:spLocks noGrp="1"/>
-          </p:cNvSpPr>
-          <p:nvPr>
-            <p:ph idx="1"/>
-          </p:nvPr>
-        </p:nvSpPr>
-        <p:spPr>
-          <a:xfrm>
-            <a:off x="241041" y="1498909"/>
-            <a:ext cx="4264284" cy="5222566"/>
-          </a:xfrm>
-        </p:spPr>
-        <p:txBody>
-          <a:bodyPr vert="horz" lIns="91440" tIns="45720" rIns="91440" bIns="45720" rtlCol="0">
-            <a:normAutofit/>
-          </a:bodyPr>
-          <a:lstStyle/>
-          <a:p>
-            <a:pPr algn="ctr">
-              <a:buClr>
-                <a:srgbClr val="C00000"/>
-              </a:buClr>
-              <a:buFont typeface="Wingdings" panose="05000000000000000000" pitchFamily="2" charset="2"/>
-              <a:buChar char="§"/>
-            </a:pPr>
-            <a:r>
-              <a:rPr lang="en-GB" dirty="0"/>
-              <a:t>Stats </a:t>
-            </a:r>
-          </a:p>
-        </p:txBody>
-      </p:sp>
-      <p:sp>
-        <p:nvSpPr>
-          <p:cNvPr id="4" name="Footer Placeholder 3"/>
+              <a:t>Dd</a:t>
+            </a:r>
+          </a:p>
+          <a:p>
+            <a:pPr lvl="0">
+              <a:buFont typeface="Wingdings" panose="05000000000000000000" pitchFamily="2" charset="2"/>
+              <a:buChar char="§"/>
+            </a:pPr>
+            <a:endParaRPr lang="en-GB" sz="1400" dirty="0">
+              <a:solidFill>
+                <a:prstClr val="black"/>
+              </a:solidFill>
+              <a:latin typeface="Arial" panose="020B0604020202020204" pitchFamily="34" charset="0"/>
+              <a:cs typeface="Arial" panose="020B0604020202020204" pitchFamily="34" charset="0"/>
+            </a:endParaRPr>
+          </a:p>
+          <a:p>
+            <a:pPr lvl="0">
+              <a:buFont typeface="Wingdings" panose="05000000000000000000" pitchFamily="2" charset="2"/>
+              <a:buChar char="§"/>
+            </a:pPr>
+            <a:endParaRPr lang="en-GB" sz="1400" dirty="0">
+              <a:solidFill>
+                <a:prstClr val="black"/>
+              </a:solidFill>
+              <a:latin typeface="Arial" panose="020B0604020202020204" pitchFamily="34" charset="0"/>
+              <a:cs typeface="Arial" panose="020B0604020202020204" pitchFamily="34" charset="0"/>
+            </a:endParaRPr>
+          </a:p>
+          <a:p>
+            <a:pPr lvl="0">
+              <a:buFont typeface="Wingdings" panose="05000000000000000000" pitchFamily="2" charset="2"/>
+              <a:buChar char="§"/>
+            </a:pPr>
+            <a:endParaRPr lang="en-GB" sz="1400" dirty="0">
+              <a:solidFill>
+                <a:prstClr val="black"/>
+              </a:solidFill>
+              <a:latin typeface="Arial" panose="020B0604020202020204" pitchFamily="34" charset="0"/>
+              <a:cs typeface="Arial" panose="020B0604020202020204" pitchFamily="34" charset="0"/>
+            </a:endParaRPr>
+          </a:p>
+          <a:p>
+            <a:pPr lvl="0">
+              <a:buFont typeface="Wingdings" panose="05000000000000000000" pitchFamily="2" charset="2"/>
+              <a:buChar char="§"/>
+            </a:pPr>
+            <a:endParaRPr lang="en-GB" sz="1400" dirty="0">
+              <a:solidFill>
+                <a:prstClr val="black"/>
+              </a:solidFill>
+              <a:latin typeface="Arial" panose="020B0604020202020204" pitchFamily="34" charset="0"/>
+              <a:cs typeface="Arial" panose="020B0604020202020204" pitchFamily="34" charset="0"/>
+            </a:endParaRPr>
+          </a:p>
+          <a:p>
+            <a:pPr lvl="0">
+              <a:buFont typeface="Wingdings" panose="05000000000000000000" pitchFamily="2" charset="2"/>
+              <a:buChar char="§"/>
+            </a:pPr>
+            <a:endParaRPr lang="en-GB" sz="1400" dirty="0">
+              <a:solidFill>
+                <a:prstClr val="black"/>
+              </a:solidFill>
+              <a:latin typeface="Arial" panose="020B0604020202020204" pitchFamily="34" charset="0"/>
+              <a:cs typeface="Arial" panose="020B0604020202020204" pitchFamily="34" charset="0"/>
+            </a:endParaRPr>
+          </a:p>
+          <a:p>
+            <a:pPr lvl="0">
+              <a:buFont typeface="Wingdings" panose="05000000000000000000" pitchFamily="2" charset="2"/>
+              <a:buChar char="§"/>
+            </a:pPr>
+            <a:endParaRPr lang="en-GB" sz="1400" dirty="0">
+              <a:solidFill>
+                <a:prstClr val="black"/>
+              </a:solidFill>
+              <a:latin typeface="Arial" panose="020B0604020202020204" pitchFamily="34" charset="0"/>
+              <a:cs typeface="Arial" panose="020B0604020202020204" pitchFamily="34" charset="0"/>
+            </a:endParaRPr>
+          </a:p>
+          <a:p>
+            <a:pPr lvl="0">
+              <a:buFont typeface="Wingdings" panose="05000000000000000000" pitchFamily="2" charset="2"/>
+              <a:buChar char="§"/>
+            </a:pPr>
+            <a:endParaRPr lang="en-GB" sz="1400" dirty="0">
+              <a:solidFill>
+                <a:prstClr val="black"/>
+              </a:solidFill>
+              <a:latin typeface="Arial" panose="020B0604020202020204" pitchFamily="34" charset="0"/>
+              <a:cs typeface="Arial" panose="020B0604020202020204" pitchFamily="34" charset="0"/>
+            </a:endParaRPr>
+          </a:p>
+          <a:p>
+            <a:pPr lvl="0">
+              <a:buFont typeface="Wingdings" panose="05000000000000000000" pitchFamily="2" charset="2"/>
+              <a:buChar char="§"/>
+            </a:pPr>
+            <a:endParaRPr lang="en-GB" sz="1400" dirty="0">
+              <a:solidFill>
+                <a:prstClr val="black"/>
+              </a:solidFill>
+              <a:latin typeface="Arial" panose="020B0604020202020204" pitchFamily="34" charset="0"/>
+              <a:cs typeface="Arial" panose="020B0604020202020204" pitchFamily="34" charset="0"/>
+            </a:endParaRPr>
+          </a:p>
+          <a:p>
+            <a:pPr lvl="0">
+              <a:buFont typeface="Wingdings" panose="05000000000000000000" pitchFamily="2" charset="2"/>
+              <a:buChar char="§"/>
+            </a:pPr>
+            <a:endParaRPr lang="en-GB" sz="1400" dirty="0">
+              <a:solidFill>
+                <a:prstClr val="black"/>
+              </a:solidFill>
+              <a:latin typeface="Arial" panose="020B0604020202020204" pitchFamily="34" charset="0"/>
+              <a:cs typeface="Arial" panose="020B0604020202020204" pitchFamily="34" charset="0"/>
+            </a:endParaRPr>
+          </a:p>
+          <a:p>
+            <a:pPr lvl="0">
+              <a:buFont typeface="Wingdings" panose="05000000000000000000" pitchFamily="2" charset="2"/>
+              <a:buChar char="§"/>
+            </a:pPr>
+            <a:endParaRPr lang="en-GB" sz="1400" dirty="0">
+              <a:solidFill>
+                <a:prstClr val="black"/>
+              </a:solidFill>
+              <a:latin typeface="Arial" panose="020B0604020202020204" pitchFamily="34" charset="0"/>
+              <a:cs typeface="Arial" panose="020B0604020202020204" pitchFamily="34" charset="0"/>
+            </a:endParaRPr>
+          </a:p>
+          <a:p>
+            <a:pPr lvl="0">
+              <a:buFont typeface="Wingdings" panose="05000000000000000000" pitchFamily="2" charset="2"/>
+              <a:buChar char="§"/>
+            </a:pPr>
+            <a:endParaRPr lang="en-GB" sz="1400" dirty="0">
+              <a:solidFill>
+                <a:prstClr val="black"/>
+              </a:solidFill>
+              <a:latin typeface="Arial" panose="020B0604020202020204" pitchFamily="34" charset="0"/>
+              <a:cs typeface="Arial" panose="020B0604020202020204" pitchFamily="34" charset="0"/>
+            </a:endParaRPr>
+          </a:p>
+          <a:p>
+            <a:pPr lvl="0">
+              <a:buFont typeface="Wingdings" panose="05000000000000000000" pitchFamily="2" charset="2"/>
+              <a:buChar char="§"/>
+            </a:pPr>
+            <a:endParaRPr lang="en-GB" sz="1400" dirty="0">
+              <a:solidFill>
+                <a:prstClr val="black"/>
+              </a:solidFill>
+              <a:latin typeface="Arial" panose="020B0604020202020204" pitchFamily="34" charset="0"/>
+              <a:cs typeface="Arial" panose="020B0604020202020204" pitchFamily="34" charset="0"/>
+            </a:endParaRPr>
+          </a:p>
+          <a:p>
+            <a:pPr lvl="0">
+              <a:buFont typeface="Wingdings" panose="05000000000000000000" pitchFamily="2" charset="2"/>
+              <a:buChar char="§"/>
+            </a:pPr>
+            <a:endParaRPr lang="en-GB" sz="1400" dirty="0">
+              <a:solidFill>
+                <a:prstClr val="black"/>
+              </a:solidFill>
+              <a:latin typeface="Arial" panose="020B0604020202020204" pitchFamily="34" charset="0"/>
+              <a:cs typeface="Arial" panose="020B0604020202020204" pitchFamily="34" charset="0"/>
+            </a:endParaRPr>
+          </a:p>
+          <a:p>
+            <a:pPr lvl="0">
+              <a:buFont typeface="Wingdings" panose="05000000000000000000" pitchFamily="2" charset="2"/>
+              <a:buChar char="§"/>
+            </a:pPr>
+            <a:endParaRPr lang="en-GB" sz="1400" dirty="0">
+              <a:solidFill>
+                <a:prstClr val="black"/>
+              </a:solidFill>
+              <a:latin typeface="Arial" panose="020B0604020202020204" pitchFamily="34" charset="0"/>
+              <a:cs typeface="Arial" panose="020B0604020202020204" pitchFamily="34" charset="0"/>
+            </a:endParaRPr>
+          </a:p>
+          <a:p>
+            <a:pPr lvl="0">
+              <a:buFont typeface="Wingdings" panose="05000000000000000000" pitchFamily="2" charset="2"/>
+              <a:buChar char="§"/>
+            </a:pPr>
+            <a:endParaRPr lang="en-GB" sz="1400" dirty="0">
+              <a:solidFill>
+                <a:prstClr val="black"/>
+              </a:solidFill>
+              <a:latin typeface="Arial" panose="020B0604020202020204" pitchFamily="34" charset="0"/>
+              <a:cs typeface="Arial" panose="020B0604020202020204" pitchFamily="34" charset="0"/>
+            </a:endParaRPr>
+          </a:p>
+        </p:txBody>
+      </p:sp>
+      <p:sp>
+        <p:nvSpPr>
+          <p:cNvPr id="7" name="Footer Placeholder 6">
+            <a:extLst>
+              <a:ext uri="{FF2B5EF4-FFF2-40B4-BE49-F238E27FC236}">
+                <a16:creationId xmlns:a16="http://schemas.microsoft.com/office/drawing/2014/main" id="{3FBF2E33-ACB5-4D4C-B940-C35EB6281647}"/>
+              </a:ext>
+            </a:extLst>
+          </p:cNvPr>
           <p:cNvSpPr>
             <a:spLocks noGrp="1"/>
           </p:cNvSpPr>
@@ -4536,7 +5019,13 @@
       </p:sp>
       <p:sp>
         <p:nvSpPr>
-          <p:cNvPr id="5" name="Slide Number Placeholder 4"/>
+          <p:cNvPr id="8" name="Slide Number Placeholder 7">
+            <a:extLst>
+              <a:ext uri="{FF2B5EF4-FFF2-40B4-BE49-F238E27FC236}">
+                <a16:creationId xmlns:a16="http://schemas.microsoft.com/office/drawing/2014/main" id="{87074E69-1923-4579-A3FC-328DAE9829BD}"/>
+              </a:ext>
+            </a:extLst>
+          </p:cNvPr>
           <p:cNvSpPr>
             <a:spLocks noGrp="1"/>
           </p:cNvSpPr>
@@ -4557,46 +5046,10 @@
           </a:p>
         </p:txBody>
       </p:sp>
-      <p:sp>
-        <p:nvSpPr>
-          <p:cNvPr id="7" name="TextBox 6"/>
-          <p:cNvSpPr txBox="1"/>
-          <p:nvPr/>
-        </p:nvSpPr>
-        <p:spPr>
-          <a:xfrm>
-            <a:off x="8815892" y="6352143"/>
-            <a:ext cx="3079376" cy="292388"/>
-          </a:xfrm>
-          <a:prstGeom prst="rect">
-            <a:avLst/>
-          </a:prstGeom>
-          <a:noFill/>
-        </p:spPr>
-        <p:txBody>
-          <a:bodyPr wrap="square" rtlCol="0">
-            <a:spAutoFit/>
-          </a:bodyPr>
-          <a:lstStyle/>
-          <a:p>
-            <a:r>
-              <a:rPr lang="en-GB" sz="1300" dirty="0"/>
-              <a:t>Source: </a:t>
-            </a:r>
-            <a:r>
-              <a:rPr lang="en-GB" sz="1300" dirty="0">
-                <a:hlinkClick r:id="rId3"/>
-              </a:rPr>
-              <a:t>Statista 2018</a:t>
-            </a:r>
-            <a:endParaRPr lang="en-GB" sz="1300" dirty="0"/>
-          </a:p>
-        </p:txBody>
-      </p:sp>
     </p:spTree>
     <p:extLst>
       <p:ext uri="{BB962C8B-B14F-4D97-AF65-F5344CB8AC3E}">
-        <p14:creationId xmlns:p14="http://schemas.microsoft.com/office/powerpoint/2010/main" val="1772839151"/>
+        <p14:creationId xmlns:p14="http://schemas.microsoft.com/office/powerpoint/2010/main" val="3353978972"/>
       </p:ext>
     </p:extLst>
   </p:cSld>
@@ -4635,6 +5088,187 @@
         </p:nvSpPr>
         <p:spPr>
           <a:xfrm>
+            <a:off x="241041" y="247126"/>
+            <a:ext cx="10515600" cy="1325563"/>
+          </a:xfrm>
+        </p:spPr>
+        <p:txBody>
+          <a:bodyPr/>
+          <a:lstStyle/>
+          <a:p>
+            <a:r>
+              <a:rPr lang="en-GB" dirty="0">
+                <a:solidFill>
+                  <a:srgbClr val="C00000"/>
+                </a:solidFill>
+                <a:latin typeface="Arial" panose="020B0604020202020204" pitchFamily="34" charset="0"/>
+                <a:cs typeface="Arial" panose="020B0604020202020204" pitchFamily="34" charset="0"/>
+              </a:rPr>
+              <a:t>WHY a good opportunity?</a:t>
+            </a:r>
+          </a:p>
+        </p:txBody>
+      </p:sp>
+      <p:sp>
+        <p:nvSpPr>
+          <p:cNvPr id="3" name="Content Placeholder 2"/>
+          <p:cNvSpPr>
+            <a:spLocks noGrp="1"/>
+          </p:cNvSpPr>
+          <p:nvPr>
+            <p:ph idx="1"/>
+          </p:nvPr>
+        </p:nvSpPr>
+        <p:spPr>
+          <a:xfrm>
+            <a:off x="241041" y="1498909"/>
+            <a:ext cx="4264284" cy="5222566"/>
+          </a:xfrm>
+        </p:spPr>
+        <p:txBody>
+          <a:bodyPr vert="horz" lIns="91440" tIns="45720" rIns="91440" bIns="45720" rtlCol="0">
+            <a:normAutofit/>
+          </a:bodyPr>
+          <a:lstStyle/>
+          <a:p>
+            <a:pPr algn="ctr">
+              <a:buClr>
+                <a:srgbClr val="C00000"/>
+              </a:buClr>
+              <a:buFont typeface="Wingdings" panose="05000000000000000000" pitchFamily="2" charset="2"/>
+              <a:buChar char="§"/>
+            </a:pPr>
+            <a:r>
+              <a:rPr lang="en-GB" dirty="0"/>
+              <a:t>Stats </a:t>
+            </a:r>
+          </a:p>
+        </p:txBody>
+      </p:sp>
+      <p:sp>
+        <p:nvSpPr>
+          <p:cNvPr id="4" name="Footer Placeholder 3"/>
+          <p:cNvSpPr>
+            <a:spLocks noGrp="1"/>
+          </p:cNvSpPr>
+          <p:nvPr>
+            <p:ph type="ftr" sz="quarter" idx="11"/>
+          </p:nvPr>
+        </p:nvSpPr>
+        <p:spPr/>
+        <p:txBody>
+          <a:bodyPr/>
+          <a:lstStyle/>
+          <a:p>
+            <a:r>
+              <a:rPr lang="pt-BR"/>
+              <a:t>Alex Papakyriacou  09alexpapa@gmail.com</a:t>
+            </a:r>
+            <a:endParaRPr lang="en-GB"/>
+          </a:p>
+        </p:txBody>
+      </p:sp>
+      <p:sp>
+        <p:nvSpPr>
+          <p:cNvPr id="5" name="Slide Number Placeholder 4"/>
+          <p:cNvSpPr>
+            <a:spLocks noGrp="1"/>
+          </p:cNvSpPr>
+          <p:nvPr>
+            <p:ph type="sldNum" sz="quarter" idx="12"/>
+          </p:nvPr>
+        </p:nvSpPr>
+        <p:spPr/>
+        <p:txBody>
+          <a:bodyPr/>
+          <a:lstStyle/>
+          <a:p>
+            <a:fld id="{A4C8CDC6-2C42-4831-B4F4-6013482D25AC}" type="slidenum">
+              <a:rPr lang="en-GB" smtClean="0"/>
+              <a:t>12</a:t>
+            </a:fld>
+            <a:endParaRPr lang="en-GB"/>
+          </a:p>
+        </p:txBody>
+      </p:sp>
+      <p:sp>
+        <p:nvSpPr>
+          <p:cNvPr id="7" name="TextBox 6"/>
+          <p:cNvSpPr txBox="1"/>
+          <p:nvPr/>
+        </p:nvSpPr>
+        <p:spPr>
+          <a:xfrm>
+            <a:off x="8815892" y="6352143"/>
+            <a:ext cx="3079376" cy="292388"/>
+          </a:xfrm>
+          <a:prstGeom prst="rect">
+            <a:avLst/>
+          </a:prstGeom>
+          <a:noFill/>
+        </p:spPr>
+        <p:txBody>
+          <a:bodyPr wrap="square" rtlCol="0">
+            <a:spAutoFit/>
+          </a:bodyPr>
+          <a:lstStyle/>
+          <a:p>
+            <a:r>
+              <a:rPr lang="en-GB" sz="1300" dirty="0"/>
+              <a:t>Source: </a:t>
+            </a:r>
+            <a:r>
+              <a:rPr lang="en-GB" sz="1300" dirty="0">
+                <a:hlinkClick r:id="rId3"/>
+              </a:rPr>
+              <a:t>Statista 2018</a:t>
+            </a:r>
+            <a:endParaRPr lang="en-GB" sz="1300" dirty="0"/>
+          </a:p>
+        </p:txBody>
+      </p:sp>
+    </p:spTree>
+    <p:extLst>
+      <p:ext uri="{BB962C8B-B14F-4D97-AF65-F5344CB8AC3E}">
+        <p14:creationId xmlns:p14="http://schemas.microsoft.com/office/powerpoint/2010/main" val="1772839151"/>
+      </p:ext>
+    </p:extLst>
+  </p:cSld>
+  <p:clrMapOvr>
+    <a:masterClrMapping/>
+  </p:clrMapOvr>
+</p:sld>
+</file>
+
+<file path=ppt/slides/slide13.xml><?xml version="1.0" encoding="utf-8"?>
+<p:sld xmlns:a="http://schemas.openxmlformats.org/drawingml/2006/main" xmlns:r="http://schemas.openxmlformats.org/officeDocument/2006/relationships" xmlns:p="http://schemas.openxmlformats.org/presentationml/2006/main">
+  <p:cSld>
+    <p:spTree>
+      <p:nvGrpSpPr>
+        <p:cNvPr id="1" name=""/>
+        <p:cNvGrpSpPr/>
+        <p:nvPr/>
+      </p:nvGrpSpPr>
+      <p:grpSpPr>
+        <a:xfrm>
+          <a:off x="0" y="0"/>
+          <a:ext cx="0" cy="0"/>
+          <a:chOff x="0" y="0"/>
+          <a:chExt cx="0" cy="0"/>
+        </a:xfrm>
+      </p:grpSpPr>
+      <p:sp>
+        <p:nvSpPr>
+          <p:cNvPr id="2" name="Title 1"/>
+          <p:cNvSpPr>
+            <a:spLocks noGrp="1"/>
+          </p:cNvSpPr>
+          <p:nvPr>
+            <p:ph type="title"/>
+          </p:nvPr>
+        </p:nvSpPr>
+        <p:spPr>
+          <a:xfrm>
             <a:off x="256309" y="336620"/>
             <a:ext cx="10515600" cy="1325563"/>
           </a:xfrm>
@@ -4827,7 +5461,7 @@
           <a:p>
             <a:fld id="{A4C8CDC6-2C42-4831-B4F4-6013482D25AC}" type="slidenum">
               <a:rPr lang="en-GB" smtClean="0"/>
-              <a:t>12</a:t>
+              <a:t>13</a:t>
             </a:fld>
             <a:endParaRPr lang="en-GB"/>
           </a:p>
@@ -5062,10 +5696,53 @@
               </a:rPr>
               <a:t>Git</a:t>
             </a:r>
-            <a:endParaRPr lang="en-GB" sz="1400" dirty="0">
-              <a:latin typeface="Arial" panose="020B0604020202020204" pitchFamily="34" charset="0"/>
-              <a:cs typeface="Arial" panose="020B0604020202020204" pitchFamily="34" charset="0"/>
-            </a:endParaRPr>
+            <a:r>
+              <a:rPr lang="en-GB" sz="1400" dirty="0">
+                <a:latin typeface="Arial" panose="020B0604020202020204" pitchFamily="34" charset="0"/>
+                <a:cs typeface="Arial" panose="020B0604020202020204" pitchFamily="34" charset="0"/>
+              </a:rPr>
+              <a:t>   ( </a:t>
+            </a:r>
+            <a:r>
+              <a:rPr lang="en-GB" sz="1400" dirty="0" err="1">
+                <a:latin typeface="Arial" panose="020B0604020202020204" pitchFamily="34" charset="0"/>
+                <a:cs typeface="Arial" panose="020B0604020202020204" pitchFamily="34" charset="0"/>
+              </a:rPr>
+              <a:t>Jupyter</a:t>
+            </a:r>
+            <a:r>
+              <a:rPr lang="en-GB" sz="1400" dirty="0">
+                <a:latin typeface="Arial" panose="020B0604020202020204" pitchFamily="34" charset="0"/>
+                <a:cs typeface="Arial" panose="020B0604020202020204" pitchFamily="34" charset="0"/>
+              </a:rPr>
+              <a:t> )</a:t>
+            </a:r>
+          </a:p>
+          <a:p>
+            <a:pPr lvl="1">
+              <a:buFont typeface="Wingdings" panose="05000000000000000000" pitchFamily="2" charset="2"/>
+              <a:buChar char="§"/>
+            </a:pPr>
+            <a:r>
+              <a:rPr lang="en-GB" sz="1000" dirty="0">
+                <a:latin typeface="Arial" panose="020B0604020202020204" pitchFamily="34" charset="0"/>
+                <a:cs typeface="Arial" panose="020B0604020202020204" pitchFamily="34" charset="0"/>
+              </a:rPr>
+              <a:t>Augmented Dickey–Fuller test</a:t>
+            </a:r>
+          </a:p>
+          <a:p>
+            <a:pPr lvl="1">
+              <a:buFont typeface="Wingdings" panose="05000000000000000000" pitchFamily="2" charset="2"/>
+              <a:buChar char="§"/>
+            </a:pPr>
+            <a:r>
+              <a:rPr lang="en-GB" sz="1000" dirty="0">
+                <a:latin typeface="Arial" panose="020B0604020202020204" pitchFamily="34" charset="0"/>
+                <a:cs typeface="Arial" panose="020B0604020202020204" pitchFamily="34" charset="0"/>
+              </a:rPr>
+              <a:t>Lagged data time series for training </a:t>
+            </a:r>
           </a:p>
           <a:p>
             <a:pPr>
@@ -5094,10 +5771,13 @@
               </a:rPr>
               <a:t>Git</a:t>
             </a:r>
-            <a:endParaRPr lang="en-GB" sz="1400" dirty="0">
-              <a:latin typeface="Arial" panose="020B0604020202020204" pitchFamily="34" charset="0"/>
-              <a:cs typeface="Arial" panose="020B0604020202020204" pitchFamily="34" charset="0"/>
-            </a:endParaRPr>
+            <a:r>
+              <a:rPr lang="en-GB" sz="1400" dirty="0">
+                <a:latin typeface="Arial" panose="020B0604020202020204" pitchFamily="34" charset="0"/>
+                <a:cs typeface="Arial" panose="020B0604020202020204" pitchFamily="34" charset="0"/>
+              </a:rPr>
+              <a:t>   ( R )</a:t>
+            </a:r>
           </a:p>
           <a:p>
             <a:pPr lvl="1">
@@ -6545,10 +7225,10 @@
       </p:grpSpPr>
       <p:sp>
         <p:nvSpPr>
-          <p:cNvPr id="2" name="Title 1">
+          <p:cNvPr id="2" name="Footer Placeholder 1">
             <a:extLst>
               <a:ext uri="{FF2B5EF4-FFF2-40B4-BE49-F238E27FC236}">
-                <a16:creationId xmlns:a16="http://schemas.microsoft.com/office/drawing/2014/main" id="{CE9D39DE-58E4-4F7D-BFFF-ABCD3F80F6C0}"/>
+                <a16:creationId xmlns:a16="http://schemas.microsoft.com/office/drawing/2014/main" id="{790F50FD-09EC-44B8-AA08-653BCFCA3BA1}"/>
               </a:ext>
             </a:extLst>
           </p:cNvPr>
@@ -6556,576 +7236,28 @@
             <a:spLocks noGrp="1"/>
           </p:cNvSpPr>
           <p:nvPr>
-            <p:ph type="title"/>
-          </p:nvPr>
-        </p:nvSpPr>
-        <p:spPr>
-          <a:xfrm>
-            <a:off x="839788" y="365126"/>
-            <a:ext cx="10439400" cy="747238"/>
-          </a:xfrm>
-        </p:spPr>
-        <p:txBody>
-          <a:bodyPr>
-            <a:normAutofit/>
-          </a:bodyPr>
-          <a:lstStyle/>
-          <a:p>
-            <a:r>
-              <a:rPr lang="en-GB" sz="2400" b="1" dirty="0">
-                <a:solidFill>
-                  <a:srgbClr val="C00000"/>
-                </a:solidFill>
-                <a:latin typeface="Arial" panose="020B0604020202020204" pitchFamily="34" charset="0"/>
-                <a:ea typeface="+mn-ea"/>
-                <a:cs typeface="Arial" panose="020B0604020202020204" pitchFamily="34" charset="0"/>
-              </a:rPr>
-              <a:t>Google AdWords Data	</a:t>
-            </a:r>
-          </a:p>
-        </p:txBody>
-      </p:sp>
-      <p:sp>
-        <p:nvSpPr>
-          <p:cNvPr id="3" name="Text Placeholder 2">
+            <p:ph type="ftr" sz="quarter" idx="11"/>
+          </p:nvPr>
+        </p:nvSpPr>
+        <p:spPr/>
+        <p:txBody>
+          <a:bodyPr/>
+          <a:lstStyle/>
+          <a:p>
+            <a:r>
+              <a:rPr lang="pt-BR"/>
+              <a:t>Alex Papakyriacou  09alexpapa@gmail.com</a:t>
+            </a:r>
+            <a:endParaRPr lang="en-GB"/>
+          </a:p>
+        </p:txBody>
+      </p:sp>
+      <p:sp>
+        <p:nvSpPr>
+          <p:cNvPr id="3" name="Slide Number Placeholder 2">
             <a:extLst>
               <a:ext uri="{FF2B5EF4-FFF2-40B4-BE49-F238E27FC236}">
-                <a16:creationId xmlns:a16="http://schemas.microsoft.com/office/drawing/2014/main" id="{B7946FBB-E702-40DD-BB5B-F596FD4134C4}"/>
-              </a:ext>
-            </a:extLst>
-          </p:cNvPr>
-          <p:cNvSpPr>
-            <a:spLocks noGrp="1"/>
-          </p:cNvSpPr>
-          <p:nvPr>
-            <p:ph type="body" idx="1"/>
-          </p:nvPr>
-        </p:nvSpPr>
-        <p:spPr>
-          <a:xfrm>
-            <a:off x="836612" y="1185864"/>
-            <a:ext cx="5157787" cy="823912"/>
-          </a:xfrm>
-        </p:spPr>
-        <p:txBody>
-          <a:bodyPr>
-            <a:normAutofit/>
-          </a:bodyPr>
-          <a:lstStyle/>
-          <a:p>
-            <a:endParaRPr lang="en-GB" sz="1800" dirty="0">
-              <a:solidFill>
-                <a:srgbClr val="C00000"/>
-              </a:solidFill>
-              <a:latin typeface="Arial" panose="020B0604020202020204" pitchFamily="34" charset="0"/>
-              <a:cs typeface="Arial" panose="020B0604020202020204" pitchFamily="34" charset="0"/>
-            </a:endParaRPr>
-          </a:p>
-        </p:txBody>
-      </p:sp>
-      <p:sp>
-        <p:nvSpPr>
-          <p:cNvPr id="4" name="Content Placeholder 3">
-            <a:extLst>
-              <a:ext uri="{FF2B5EF4-FFF2-40B4-BE49-F238E27FC236}">
-                <a16:creationId xmlns:a16="http://schemas.microsoft.com/office/drawing/2014/main" id="{2A72F672-450E-4C75-8312-350C0A1FC667}"/>
-              </a:ext>
-            </a:extLst>
-          </p:cNvPr>
-          <p:cNvSpPr>
-            <a:spLocks noGrp="1"/>
-          </p:cNvSpPr>
-          <p:nvPr>
-            <p:ph sz="half" idx="2"/>
-          </p:nvPr>
-        </p:nvSpPr>
-        <p:spPr>
-          <a:xfrm>
-            <a:off x="839788" y="2083276"/>
-            <a:ext cx="5157787" cy="4106387"/>
-          </a:xfrm>
-        </p:spPr>
-        <p:txBody>
-          <a:bodyPr>
-            <a:normAutofit/>
-          </a:bodyPr>
-          <a:lstStyle/>
-          <a:p>
-            <a:pPr>
-              <a:buFont typeface="Wingdings" panose="05000000000000000000" pitchFamily="2" charset="2"/>
-              <a:buChar char="§"/>
-            </a:pPr>
-            <a:r>
-              <a:rPr lang="en-GB" sz="1400" dirty="0">
-                <a:latin typeface="Arial" panose="020B0604020202020204" pitchFamily="34" charset="0"/>
-                <a:cs typeface="Arial" panose="020B0604020202020204" pitchFamily="34" charset="0"/>
-              </a:rPr>
-              <a:t>Dd</a:t>
-            </a:r>
-          </a:p>
-          <a:p>
-            <a:pPr>
-              <a:buFont typeface="Wingdings" panose="05000000000000000000" pitchFamily="2" charset="2"/>
-              <a:buChar char="§"/>
-            </a:pPr>
-            <a:endParaRPr lang="en-GB" sz="1400" dirty="0">
-              <a:latin typeface="Arial" panose="020B0604020202020204" pitchFamily="34" charset="0"/>
-              <a:cs typeface="Arial" panose="020B0604020202020204" pitchFamily="34" charset="0"/>
-            </a:endParaRPr>
-          </a:p>
-          <a:p>
-            <a:pPr>
-              <a:buFont typeface="Wingdings" panose="05000000000000000000" pitchFamily="2" charset="2"/>
-              <a:buChar char="§"/>
-            </a:pPr>
-            <a:endParaRPr lang="en-GB" sz="1400" dirty="0">
-              <a:latin typeface="Arial" panose="020B0604020202020204" pitchFamily="34" charset="0"/>
-              <a:cs typeface="Arial" panose="020B0604020202020204" pitchFamily="34" charset="0"/>
-            </a:endParaRPr>
-          </a:p>
-          <a:p>
-            <a:pPr>
-              <a:buFont typeface="Wingdings" panose="05000000000000000000" pitchFamily="2" charset="2"/>
-              <a:buChar char="§"/>
-            </a:pPr>
-            <a:endParaRPr lang="en-GB" sz="1400" dirty="0">
-              <a:latin typeface="Arial" panose="020B0604020202020204" pitchFamily="34" charset="0"/>
-              <a:cs typeface="Arial" panose="020B0604020202020204" pitchFamily="34" charset="0"/>
-            </a:endParaRPr>
-          </a:p>
-          <a:p>
-            <a:pPr>
-              <a:buFont typeface="Wingdings" panose="05000000000000000000" pitchFamily="2" charset="2"/>
-              <a:buChar char="§"/>
-            </a:pPr>
-            <a:endParaRPr lang="en-GB" sz="1400" dirty="0">
-              <a:latin typeface="Arial" panose="020B0604020202020204" pitchFamily="34" charset="0"/>
-              <a:cs typeface="Arial" panose="020B0604020202020204" pitchFamily="34" charset="0"/>
-            </a:endParaRPr>
-          </a:p>
-          <a:p>
-            <a:pPr>
-              <a:buFont typeface="Wingdings" panose="05000000000000000000" pitchFamily="2" charset="2"/>
-              <a:buChar char="§"/>
-            </a:pPr>
-            <a:endParaRPr lang="en-GB" sz="1400" dirty="0">
-              <a:latin typeface="Arial" panose="020B0604020202020204" pitchFamily="34" charset="0"/>
-              <a:cs typeface="Arial" panose="020B0604020202020204" pitchFamily="34" charset="0"/>
-            </a:endParaRPr>
-          </a:p>
-          <a:p>
-            <a:pPr>
-              <a:buFont typeface="Wingdings" panose="05000000000000000000" pitchFamily="2" charset="2"/>
-              <a:buChar char="§"/>
-            </a:pPr>
-            <a:endParaRPr lang="en-GB" sz="1400" dirty="0">
-              <a:latin typeface="Arial" panose="020B0604020202020204" pitchFamily="34" charset="0"/>
-              <a:cs typeface="Arial" panose="020B0604020202020204" pitchFamily="34" charset="0"/>
-            </a:endParaRPr>
-          </a:p>
-          <a:p>
-            <a:pPr>
-              <a:buFont typeface="Wingdings" panose="05000000000000000000" pitchFamily="2" charset="2"/>
-              <a:buChar char="§"/>
-            </a:pPr>
-            <a:endParaRPr lang="en-GB" sz="1400" dirty="0">
-              <a:latin typeface="Arial" panose="020B0604020202020204" pitchFamily="34" charset="0"/>
-              <a:cs typeface="Arial" panose="020B0604020202020204" pitchFamily="34" charset="0"/>
-            </a:endParaRPr>
-          </a:p>
-          <a:p>
-            <a:pPr>
-              <a:buFont typeface="Wingdings" panose="05000000000000000000" pitchFamily="2" charset="2"/>
-              <a:buChar char="§"/>
-            </a:pPr>
-            <a:endParaRPr lang="en-GB" sz="1400" dirty="0">
-              <a:latin typeface="Arial" panose="020B0604020202020204" pitchFamily="34" charset="0"/>
-              <a:cs typeface="Arial" panose="020B0604020202020204" pitchFamily="34" charset="0"/>
-            </a:endParaRPr>
-          </a:p>
-          <a:p>
-            <a:pPr>
-              <a:buFont typeface="Wingdings" panose="05000000000000000000" pitchFamily="2" charset="2"/>
-              <a:buChar char="§"/>
-            </a:pPr>
-            <a:endParaRPr lang="en-GB" sz="1400" dirty="0">
-              <a:latin typeface="Arial" panose="020B0604020202020204" pitchFamily="34" charset="0"/>
-              <a:cs typeface="Arial" panose="020B0604020202020204" pitchFamily="34" charset="0"/>
-            </a:endParaRPr>
-          </a:p>
-          <a:p>
-            <a:pPr>
-              <a:buFont typeface="Wingdings" panose="05000000000000000000" pitchFamily="2" charset="2"/>
-              <a:buChar char="§"/>
-            </a:pPr>
-            <a:endParaRPr lang="en-GB" sz="1400" dirty="0">
-              <a:latin typeface="Arial" panose="020B0604020202020204" pitchFamily="34" charset="0"/>
-              <a:cs typeface="Arial" panose="020B0604020202020204" pitchFamily="34" charset="0"/>
-            </a:endParaRPr>
-          </a:p>
-          <a:p>
-            <a:pPr>
-              <a:buFont typeface="Wingdings" panose="05000000000000000000" pitchFamily="2" charset="2"/>
-              <a:buChar char="§"/>
-            </a:pPr>
-            <a:endParaRPr lang="en-GB" sz="1400" dirty="0">
-              <a:latin typeface="Arial" panose="020B0604020202020204" pitchFamily="34" charset="0"/>
-              <a:cs typeface="Arial" panose="020B0604020202020204" pitchFamily="34" charset="0"/>
-            </a:endParaRPr>
-          </a:p>
-          <a:p>
-            <a:pPr>
-              <a:buFont typeface="Wingdings" panose="05000000000000000000" pitchFamily="2" charset="2"/>
-              <a:buChar char="§"/>
-            </a:pPr>
-            <a:endParaRPr lang="en-GB" sz="1400" dirty="0">
-              <a:latin typeface="Arial" panose="020B0604020202020204" pitchFamily="34" charset="0"/>
-              <a:cs typeface="Arial" panose="020B0604020202020204" pitchFamily="34" charset="0"/>
-            </a:endParaRPr>
-          </a:p>
-          <a:p>
-            <a:pPr>
-              <a:buFont typeface="Wingdings" panose="05000000000000000000" pitchFamily="2" charset="2"/>
-              <a:buChar char="§"/>
-            </a:pPr>
-            <a:endParaRPr lang="en-GB" sz="1400" dirty="0">
-              <a:latin typeface="Arial" panose="020B0604020202020204" pitchFamily="34" charset="0"/>
-              <a:cs typeface="Arial" panose="020B0604020202020204" pitchFamily="34" charset="0"/>
-            </a:endParaRPr>
-          </a:p>
-          <a:p>
-            <a:pPr>
-              <a:buFont typeface="Wingdings" panose="05000000000000000000" pitchFamily="2" charset="2"/>
-              <a:buChar char="§"/>
-            </a:pPr>
-            <a:endParaRPr lang="en-GB" sz="1400" dirty="0">
-              <a:latin typeface="Arial" panose="020B0604020202020204" pitchFamily="34" charset="0"/>
-              <a:cs typeface="Arial" panose="020B0604020202020204" pitchFamily="34" charset="0"/>
-            </a:endParaRPr>
-          </a:p>
-          <a:p>
-            <a:pPr>
-              <a:buFont typeface="Wingdings" panose="05000000000000000000" pitchFamily="2" charset="2"/>
-              <a:buChar char="§"/>
-            </a:pPr>
-            <a:endParaRPr lang="en-GB" sz="1400" dirty="0">
-              <a:latin typeface="Arial" panose="020B0604020202020204" pitchFamily="34" charset="0"/>
-              <a:cs typeface="Arial" panose="020B0604020202020204" pitchFamily="34" charset="0"/>
-            </a:endParaRPr>
-          </a:p>
-        </p:txBody>
-      </p:sp>
-      <p:sp>
-        <p:nvSpPr>
-          <p:cNvPr id="5" name="Text Placeholder 4">
-            <a:extLst>
-              <a:ext uri="{FF2B5EF4-FFF2-40B4-BE49-F238E27FC236}">
-                <a16:creationId xmlns:a16="http://schemas.microsoft.com/office/drawing/2014/main" id="{ABD8EA33-90C7-49EC-BD42-E56F826088E4}"/>
-              </a:ext>
-            </a:extLst>
-          </p:cNvPr>
-          <p:cNvSpPr>
-            <a:spLocks noGrp="1"/>
-          </p:cNvSpPr>
-          <p:nvPr>
-            <p:ph type="body" sz="quarter" idx="3"/>
-          </p:nvPr>
-        </p:nvSpPr>
-        <p:spPr>
-          <a:xfrm>
-            <a:off x="6096000" y="1185864"/>
-            <a:ext cx="5183188" cy="823912"/>
-          </a:xfrm>
-        </p:spPr>
-        <p:txBody>
-          <a:bodyPr>
-            <a:normAutofit/>
-          </a:bodyPr>
-          <a:lstStyle/>
-          <a:p>
-            <a:endParaRPr lang="en-GB" sz="1800" dirty="0">
-              <a:solidFill>
-                <a:srgbClr val="C00000"/>
-              </a:solidFill>
-              <a:latin typeface="Arial" panose="020B0604020202020204" pitchFamily="34" charset="0"/>
-              <a:cs typeface="Arial" panose="020B0604020202020204" pitchFamily="34" charset="0"/>
-            </a:endParaRPr>
-          </a:p>
-        </p:txBody>
-      </p:sp>
-      <p:sp>
-        <p:nvSpPr>
-          <p:cNvPr id="6" name="Content Placeholder 5">
-            <a:extLst>
-              <a:ext uri="{FF2B5EF4-FFF2-40B4-BE49-F238E27FC236}">
-                <a16:creationId xmlns:a16="http://schemas.microsoft.com/office/drawing/2014/main" id="{AD116E6F-291D-4E83-B76F-21B92067EC07}"/>
-              </a:ext>
-            </a:extLst>
-          </p:cNvPr>
-          <p:cNvSpPr>
-            <a:spLocks noGrp="1"/>
-          </p:cNvSpPr>
-          <p:nvPr>
-            <p:ph sz="quarter" idx="4"/>
-          </p:nvPr>
-        </p:nvSpPr>
-        <p:spPr>
-          <a:xfrm>
-            <a:off x="6096000" y="2083276"/>
-            <a:ext cx="5183188" cy="4106387"/>
-          </a:xfrm>
-        </p:spPr>
-        <p:txBody>
-          <a:bodyPr/>
-          <a:lstStyle/>
-          <a:p>
-            <a:pPr lvl="0">
-              <a:buFont typeface="Wingdings" panose="05000000000000000000" pitchFamily="2" charset="2"/>
-              <a:buChar char="§"/>
-            </a:pPr>
-            <a:r>
-              <a:rPr lang="en-GB" sz="1400" dirty="0">
-                <a:solidFill>
-                  <a:prstClr val="black"/>
-                </a:solidFill>
-                <a:latin typeface="Arial" panose="020B0604020202020204" pitchFamily="34" charset="0"/>
-                <a:cs typeface="Arial" panose="020B0604020202020204" pitchFamily="34" charset="0"/>
-              </a:rPr>
-              <a:t>Dd</a:t>
-            </a:r>
-          </a:p>
-          <a:p>
-            <a:pPr lvl="0">
-              <a:buFont typeface="Wingdings" panose="05000000000000000000" pitchFamily="2" charset="2"/>
-              <a:buChar char="§"/>
-            </a:pPr>
-            <a:endParaRPr lang="en-GB" sz="1400" dirty="0">
-              <a:solidFill>
-                <a:prstClr val="black"/>
-              </a:solidFill>
-              <a:latin typeface="Arial" panose="020B0604020202020204" pitchFamily="34" charset="0"/>
-              <a:cs typeface="Arial" panose="020B0604020202020204" pitchFamily="34" charset="0"/>
-            </a:endParaRPr>
-          </a:p>
-          <a:p>
-            <a:pPr lvl="0">
-              <a:buFont typeface="Wingdings" panose="05000000000000000000" pitchFamily="2" charset="2"/>
-              <a:buChar char="§"/>
-            </a:pPr>
-            <a:endParaRPr lang="en-GB" sz="1400" dirty="0">
-              <a:solidFill>
-                <a:prstClr val="black"/>
-              </a:solidFill>
-              <a:latin typeface="Arial" panose="020B0604020202020204" pitchFamily="34" charset="0"/>
-              <a:cs typeface="Arial" panose="020B0604020202020204" pitchFamily="34" charset="0"/>
-            </a:endParaRPr>
-          </a:p>
-          <a:p>
-            <a:pPr lvl="0">
-              <a:buFont typeface="Wingdings" panose="05000000000000000000" pitchFamily="2" charset="2"/>
-              <a:buChar char="§"/>
-            </a:pPr>
-            <a:endParaRPr lang="en-GB" sz="1400" dirty="0">
-              <a:solidFill>
-                <a:prstClr val="black"/>
-              </a:solidFill>
-              <a:latin typeface="Arial" panose="020B0604020202020204" pitchFamily="34" charset="0"/>
-              <a:cs typeface="Arial" panose="020B0604020202020204" pitchFamily="34" charset="0"/>
-            </a:endParaRPr>
-          </a:p>
-          <a:p>
-            <a:pPr lvl="0">
-              <a:buFont typeface="Wingdings" panose="05000000000000000000" pitchFamily="2" charset="2"/>
-              <a:buChar char="§"/>
-            </a:pPr>
-            <a:endParaRPr lang="en-GB" sz="1400" dirty="0">
-              <a:solidFill>
-                <a:prstClr val="black"/>
-              </a:solidFill>
-              <a:latin typeface="Arial" panose="020B0604020202020204" pitchFamily="34" charset="0"/>
-              <a:cs typeface="Arial" panose="020B0604020202020204" pitchFamily="34" charset="0"/>
-            </a:endParaRPr>
-          </a:p>
-          <a:p>
-            <a:pPr lvl="0">
-              <a:buFont typeface="Wingdings" panose="05000000000000000000" pitchFamily="2" charset="2"/>
-              <a:buChar char="§"/>
-            </a:pPr>
-            <a:endParaRPr lang="en-GB" sz="1400" dirty="0">
-              <a:solidFill>
-                <a:prstClr val="black"/>
-              </a:solidFill>
-              <a:latin typeface="Arial" panose="020B0604020202020204" pitchFamily="34" charset="0"/>
-              <a:cs typeface="Arial" panose="020B0604020202020204" pitchFamily="34" charset="0"/>
-            </a:endParaRPr>
-          </a:p>
-          <a:p>
-            <a:pPr lvl="0">
-              <a:buFont typeface="Wingdings" panose="05000000000000000000" pitchFamily="2" charset="2"/>
-              <a:buChar char="§"/>
-            </a:pPr>
-            <a:endParaRPr lang="en-GB" sz="1400" dirty="0">
-              <a:solidFill>
-                <a:prstClr val="black"/>
-              </a:solidFill>
-              <a:latin typeface="Arial" panose="020B0604020202020204" pitchFamily="34" charset="0"/>
-              <a:cs typeface="Arial" panose="020B0604020202020204" pitchFamily="34" charset="0"/>
-            </a:endParaRPr>
-          </a:p>
-          <a:p>
-            <a:pPr lvl="0">
-              <a:buFont typeface="Wingdings" panose="05000000000000000000" pitchFamily="2" charset="2"/>
-              <a:buChar char="§"/>
-            </a:pPr>
-            <a:endParaRPr lang="en-GB" sz="1400" dirty="0">
-              <a:solidFill>
-                <a:prstClr val="black"/>
-              </a:solidFill>
-              <a:latin typeface="Arial" panose="020B0604020202020204" pitchFamily="34" charset="0"/>
-              <a:cs typeface="Arial" panose="020B0604020202020204" pitchFamily="34" charset="0"/>
-            </a:endParaRPr>
-          </a:p>
-          <a:p>
-            <a:pPr lvl="0">
-              <a:buFont typeface="Wingdings" panose="05000000000000000000" pitchFamily="2" charset="2"/>
-              <a:buChar char="§"/>
-            </a:pPr>
-            <a:endParaRPr lang="en-GB" sz="1400" dirty="0">
-              <a:solidFill>
-                <a:prstClr val="black"/>
-              </a:solidFill>
-              <a:latin typeface="Arial" panose="020B0604020202020204" pitchFamily="34" charset="0"/>
-              <a:cs typeface="Arial" panose="020B0604020202020204" pitchFamily="34" charset="0"/>
-            </a:endParaRPr>
-          </a:p>
-          <a:p>
-            <a:pPr lvl="0">
-              <a:buFont typeface="Wingdings" panose="05000000000000000000" pitchFamily="2" charset="2"/>
-              <a:buChar char="§"/>
-            </a:pPr>
-            <a:endParaRPr lang="en-GB" sz="1400" dirty="0">
-              <a:solidFill>
-                <a:prstClr val="black"/>
-              </a:solidFill>
-              <a:latin typeface="Arial" panose="020B0604020202020204" pitchFamily="34" charset="0"/>
-              <a:cs typeface="Arial" panose="020B0604020202020204" pitchFamily="34" charset="0"/>
-            </a:endParaRPr>
-          </a:p>
-          <a:p>
-            <a:pPr lvl="0">
-              <a:buFont typeface="Wingdings" panose="05000000000000000000" pitchFamily="2" charset="2"/>
-              <a:buChar char="§"/>
-            </a:pPr>
-            <a:endParaRPr lang="en-GB" sz="1400" dirty="0">
-              <a:solidFill>
-                <a:prstClr val="black"/>
-              </a:solidFill>
-              <a:latin typeface="Arial" panose="020B0604020202020204" pitchFamily="34" charset="0"/>
-              <a:cs typeface="Arial" panose="020B0604020202020204" pitchFamily="34" charset="0"/>
-            </a:endParaRPr>
-          </a:p>
-          <a:p>
-            <a:pPr lvl="0">
-              <a:buFont typeface="Wingdings" panose="05000000000000000000" pitchFamily="2" charset="2"/>
-              <a:buChar char="§"/>
-            </a:pPr>
-            <a:endParaRPr lang="en-GB" sz="1400" dirty="0">
-              <a:solidFill>
-                <a:prstClr val="black"/>
-              </a:solidFill>
-              <a:latin typeface="Arial" panose="020B0604020202020204" pitchFamily="34" charset="0"/>
-              <a:cs typeface="Arial" panose="020B0604020202020204" pitchFamily="34" charset="0"/>
-            </a:endParaRPr>
-          </a:p>
-          <a:p>
-            <a:pPr lvl="0">
-              <a:buFont typeface="Wingdings" panose="05000000000000000000" pitchFamily="2" charset="2"/>
-              <a:buChar char="§"/>
-            </a:pPr>
-            <a:endParaRPr lang="en-GB" sz="1400" dirty="0">
-              <a:solidFill>
-                <a:prstClr val="black"/>
-              </a:solidFill>
-              <a:latin typeface="Arial" panose="020B0604020202020204" pitchFamily="34" charset="0"/>
-              <a:cs typeface="Arial" panose="020B0604020202020204" pitchFamily="34" charset="0"/>
-            </a:endParaRPr>
-          </a:p>
-          <a:p>
-            <a:pPr lvl="0">
-              <a:buFont typeface="Wingdings" panose="05000000000000000000" pitchFamily="2" charset="2"/>
-              <a:buChar char="§"/>
-            </a:pPr>
-            <a:endParaRPr lang="en-GB" sz="1400" dirty="0">
-              <a:solidFill>
-                <a:prstClr val="black"/>
-              </a:solidFill>
-              <a:latin typeface="Arial" panose="020B0604020202020204" pitchFamily="34" charset="0"/>
-              <a:cs typeface="Arial" panose="020B0604020202020204" pitchFamily="34" charset="0"/>
-            </a:endParaRPr>
-          </a:p>
-          <a:p>
-            <a:pPr lvl="0">
-              <a:buFont typeface="Wingdings" panose="05000000000000000000" pitchFamily="2" charset="2"/>
-              <a:buChar char="§"/>
-            </a:pPr>
-            <a:endParaRPr lang="en-GB" sz="1400" dirty="0">
-              <a:solidFill>
-                <a:prstClr val="black"/>
-              </a:solidFill>
-              <a:latin typeface="Arial" panose="020B0604020202020204" pitchFamily="34" charset="0"/>
-              <a:cs typeface="Arial" panose="020B0604020202020204" pitchFamily="34" charset="0"/>
-            </a:endParaRPr>
-          </a:p>
-          <a:p>
-            <a:pPr lvl="0">
-              <a:buFont typeface="Wingdings" panose="05000000000000000000" pitchFamily="2" charset="2"/>
-              <a:buChar char="§"/>
-            </a:pPr>
-            <a:endParaRPr lang="en-GB" sz="1400" dirty="0">
-              <a:solidFill>
-                <a:prstClr val="black"/>
-              </a:solidFill>
-              <a:latin typeface="Arial" panose="020B0604020202020204" pitchFamily="34" charset="0"/>
-              <a:cs typeface="Arial" panose="020B0604020202020204" pitchFamily="34" charset="0"/>
-            </a:endParaRPr>
-          </a:p>
-        </p:txBody>
-      </p:sp>
-      <p:sp>
-        <p:nvSpPr>
-          <p:cNvPr id="7" name="Footer Placeholder 6">
-            <a:extLst>
-              <a:ext uri="{FF2B5EF4-FFF2-40B4-BE49-F238E27FC236}">
-                <a16:creationId xmlns:a16="http://schemas.microsoft.com/office/drawing/2014/main" id="{3FBF2E33-ACB5-4D4C-B940-C35EB6281647}"/>
-              </a:ext>
-            </a:extLst>
-          </p:cNvPr>
-          <p:cNvSpPr>
-            <a:spLocks noGrp="1"/>
-          </p:cNvSpPr>
-          <p:nvPr>
-            <p:ph type="ftr" sz="quarter" idx="11"/>
-          </p:nvPr>
-        </p:nvSpPr>
-        <p:spPr/>
-        <p:txBody>
-          <a:bodyPr/>
-          <a:lstStyle/>
-          <a:p>
-            <a:r>
-              <a:rPr lang="pt-BR"/>
-              <a:t>Alex Papakyriacou  09alexpapa@gmail.com</a:t>
-            </a:r>
-            <a:endParaRPr lang="en-GB"/>
-          </a:p>
-        </p:txBody>
-      </p:sp>
-      <p:sp>
-        <p:nvSpPr>
-          <p:cNvPr id="8" name="Slide Number Placeholder 7">
-            <a:extLst>
-              <a:ext uri="{FF2B5EF4-FFF2-40B4-BE49-F238E27FC236}">
-                <a16:creationId xmlns:a16="http://schemas.microsoft.com/office/drawing/2014/main" id="{87074E69-1923-4579-A3FC-328DAE9829BD}"/>
+                <a16:creationId xmlns:a16="http://schemas.microsoft.com/office/drawing/2014/main" id="{9694FB09-C8BF-4CC2-AC12-38049AE56101}"/>
               </a:ext>
             </a:extLst>
           </p:cNvPr>
@@ -7151,93 +7283,216 @@
       </p:sp>
       <p:sp>
         <p:nvSpPr>
-          <p:cNvPr id="9" name="Rectangle 8">
+          <p:cNvPr id="4" name="TextBox 3">
             <a:extLst>
               <a:ext uri="{FF2B5EF4-FFF2-40B4-BE49-F238E27FC236}">
-                <a16:creationId xmlns:a16="http://schemas.microsoft.com/office/drawing/2014/main" id="{82A6A96C-425B-4F2F-B034-5A07C7A20CCA}"/>
+                <a16:creationId xmlns:a16="http://schemas.microsoft.com/office/drawing/2014/main" id="{3CEE4B68-28D9-4E13-A996-C07831C8F6E8}"/>
               </a:ext>
             </a:extLst>
           </p:cNvPr>
-          <p:cNvSpPr/>
+          <p:cNvSpPr txBox="1"/>
           <p:nvPr/>
         </p:nvSpPr>
         <p:spPr>
           <a:xfrm>
-            <a:off x="836612" y="2798068"/>
-            <a:ext cx="6096000" cy="923330"/>
+            <a:off x="965200" y="782320"/>
+            <a:ext cx="10388600" cy="5078313"/>
           </a:xfrm>
           <a:prstGeom prst="rect">
             <a:avLst/>
           </a:prstGeom>
+          <a:noFill/>
         </p:spPr>
         <p:txBody>
-          <a:bodyPr>
+          <a:bodyPr wrap="square" rtlCol="0">
             <a:spAutoFit/>
           </a:bodyPr>
           <a:lstStyle/>
           <a:p>
             <a:r>
-              <a:rPr lang="en-GB" dirty="0" err="1">
+              <a:rPr lang="en-GB" b="1" dirty="0">
                 <a:solidFill>
-                  <a:srgbClr val="333333"/>
+                  <a:srgbClr val="C00000"/>
                 </a:solidFill>
-                <a:latin typeface="-apple-system"/>
               </a:rPr>
-              <a:t>Adwords</a:t>
-            </a:r>
-            <a:r>
-              <a:rPr lang="en-GB" dirty="0">
-                <a:solidFill>
-                  <a:srgbClr val="333333"/>
-                </a:solidFill>
-                <a:latin typeface="-apple-system"/>
-              </a:rPr>
-              <a:t> tool </a:t>
-            </a:r>
-            <a:r>
-              <a:rPr lang="en-GB" dirty="0" err="1">
-                <a:solidFill>
-                  <a:srgbClr val="333333"/>
-                </a:solidFill>
-                <a:latin typeface="-apple-system"/>
-              </a:rPr>
-              <a:t>isnt</a:t>
-            </a:r>
-            <a:r>
-              <a:rPr lang="en-GB" dirty="0">
-                <a:solidFill>
-                  <a:srgbClr val="333333"/>
-                </a:solidFill>
-                <a:latin typeface="-apple-system"/>
-              </a:rPr>
-              <a:t> for finding the search data , but it will show how advertisers are showing interest on a specific query . Thus showing </a:t>
-            </a:r>
-            <a:r>
-              <a:rPr lang="en-GB" dirty="0" err="1">
-                <a:solidFill>
-                  <a:srgbClr val="333333"/>
-                </a:solidFill>
-                <a:latin typeface="-apple-system"/>
-              </a:rPr>
-              <a:t>populatity</a:t>
-            </a:r>
-            <a:r>
-              <a:rPr lang="en-GB" dirty="0">
-                <a:solidFill>
-                  <a:srgbClr val="333333"/>
-                </a:solidFill>
-                <a:latin typeface="-apple-system"/>
-              </a:rPr>
-              <a:t> or competitiveness of a query .</a:t>
-            </a:r>
+              <a:t>Li, S. and Shannon Callan, C.F.A., 2016. Construction of Google Search Indices by Applying Principal Component Analysis.</a:t>
+            </a:r>
+          </a:p>
+          <a:p>
+            <a:pPr marL="285750" indent="-285750">
+              <a:buFont typeface="Arial" panose="020B0604020202020204" pitchFamily="34" charset="0"/>
+              <a:buChar char="•"/>
+            </a:pPr>
             <a:endParaRPr lang="en-GB" dirty="0"/>
+          </a:p>
+          <a:p>
+            <a:pPr marL="285750" indent="-285750">
+              <a:buFont typeface="Arial" panose="020B0604020202020204" pitchFamily="34" charset="0"/>
+              <a:buChar char="•"/>
+            </a:pPr>
+            <a:r>
+              <a:rPr lang="en-GB" dirty="0"/>
+              <a:t>Term Selection (packages BMA, BSTS) ?</a:t>
+            </a:r>
+          </a:p>
+          <a:p>
+            <a:pPr marL="742950" lvl="1" indent="-285750">
+              <a:buFont typeface="Arial" panose="020B0604020202020204" pitchFamily="34" charset="0"/>
+              <a:buChar char="•"/>
+            </a:pPr>
+            <a:r>
+              <a:rPr lang="en-GB" dirty="0"/>
+              <a:t>Primitive list </a:t>
+            </a:r>
+          </a:p>
+          <a:p>
+            <a:pPr marL="742950" lvl="1" indent="-285750">
+              <a:buFont typeface="Arial" panose="020B0604020202020204" pitchFamily="34" charset="0"/>
+              <a:buChar char="•"/>
+            </a:pPr>
+            <a:r>
+              <a:rPr lang="en-GB" dirty="0"/>
+              <a:t>Harvard dictionary economic keywords</a:t>
+            </a:r>
+          </a:p>
+          <a:p>
+            <a:pPr marL="742950" lvl="1" indent="-285750">
+              <a:buFont typeface="Arial" panose="020B0604020202020204" pitchFamily="34" charset="0"/>
+              <a:buChar char="•"/>
+            </a:pPr>
+            <a:r>
+              <a:rPr lang="en-GB" dirty="0"/>
+              <a:t>Find related searches in Google Trends and Google Correlate </a:t>
+            </a:r>
+          </a:p>
+          <a:p>
+            <a:pPr marL="742950" lvl="1" indent="-285750">
+              <a:buFont typeface="Arial" panose="020B0604020202020204" pitchFamily="34" charset="0"/>
+              <a:buChar char="•"/>
+            </a:pPr>
+            <a:r>
+              <a:rPr lang="en-GB" dirty="0"/>
+              <a:t>Filtering via correlation, Bayesian variable selection, term loading in PCA analysis</a:t>
+            </a:r>
+          </a:p>
+          <a:p>
+            <a:pPr marL="285750" indent="-285750">
+              <a:buFont typeface="Arial" panose="020B0604020202020204" pitchFamily="34" charset="0"/>
+              <a:buChar char="•"/>
+            </a:pPr>
+            <a:r>
+              <a:rPr lang="en-GB" dirty="0"/>
+              <a:t>Obtain Data and Process (packages </a:t>
+            </a:r>
+            <a:r>
+              <a:rPr lang="en-GB" dirty="0" err="1"/>
+              <a:t>gtrendsR</a:t>
+            </a:r>
+            <a:r>
+              <a:rPr lang="en-GB" dirty="0"/>
+              <a:t>, zoo, </a:t>
+            </a:r>
+            <a:r>
+              <a:rPr lang="en-GB" dirty="0" err="1"/>
+              <a:t>robustHD</a:t>
+            </a:r>
+            <a:r>
+              <a:rPr lang="en-GB" dirty="0"/>
+              <a:t>, seas) ?</a:t>
+            </a:r>
+          </a:p>
+          <a:p>
+            <a:pPr marL="742950" lvl="1" indent="-285750">
+              <a:buFont typeface="Arial" panose="020B0604020202020204" pitchFamily="34" charset="0"/>
+              <a:buChar char="•"/>
+            </a:pPr>
+            <a:r>
+              <a:rPr lang="en-GB" dirty="0"/>
+              <a:t>Convert time frequency, remove outliners, </a:t>
+            </a:r>
+            <a:r>
+              <a:rPr lang="en-GB" dirty="0" err="1"/>
+              <a:t>winsorize</a:t>
+            </a:r>
+            <a:r>
+              <a:rPr lang="en-GB" dirty="0"/>
+              <a:t>, and seasonal adjustment</a:t>
+            </a:r>
+          </a:p>
+          <a:p>
+            <a:pPr marL="285750" indent="-285750">
+              <a:buFont typeface="Arial" panose="020B0604020202020204" pitchFamily="34" charset="0"/>
+              <a:buChar char="•"/>
+            </a:pPr>
+            <a:r>
+              <a:rPr lang="en-GB" dirty="0"/>
+              <a:t>Apply Principal Component Analysis (function </a:t>
+            </a:r>
+            <a:r>
+              <a:rPr lang="en-GB" dirty="0" err="1"/>
+              <a:t>prcomp</a:t>
+            </a:r>
+            <a:r>
+              <a:rPr lang="en-GB" dirty="0"/>
+              <a:t>) Index Creation ?</a:t>
+            </a:r>
+          </a:p>
+          <a:p>
+            <a:pPr marL="742950" lvl="1" indent="-285750">
+              <a:buFont typeface="Arial" panose="020B0604020202020204" pitchFamily="34" charset="0"/>
+              <a:buChar char="•"/>
+            </a:pPr>
+            <a:r>
+              <a:rPr lang="en-GB" dirty="0"/>
+              <a:t>Create index from top principal component(s) </a:t>
+            </a:r>
+          </a:p>
+          <a:p>
+            <a:pPr marL="742950" lvl="1" indent="-285750">
+              <a:buFont typeface="Arial" panose="020B0604020202020204" pitchFamily="34" charset="0"/>
+              <a:buChar char="•"/>
+            </a:pPr>
+            <a:r>
+              <a:rPr lang="en-GB" dirty="0"/>
+              <a:t>Use of rolling window</a:t>
+            </a:r>
+          </a:p>
+          <a:p>
+            <a:pPr marL="742950" lvl="1" indent="-285750">
+              <a:buFont typeface="Arial" panose="020B0604020202020204" pitchFamily="34" charset="0"/>
+              <a:buChar char="•"/>
+            </a:pPr>
+            <a:r>
+              <a:rPr lang="en-GB" dirty="0"/>
+              <a:t>Track category loadings within the index</a:t>
+            </a:r>
+          </a:p>
+          <a:p>
+            <a:pPr marL="285750" indent="-285750">
+              <a:buFont typeface="Arial" panose="020B0604020202020204" pitchFamily="34" charset="0"/>
+              <a:buChar char="•"/>
+            </a:pPr>
+            <a:endParaRPr lang="en-GB" dirty="0"/>
+          </a:p>
+          <a:p>
+            <a:pPr marL="285750" indent="-285750">
+              <a:buFont typeface="Arial" panose="020B0604020202020204" pitchFamily="34" charset="0"/>
+              <a:buChar char="•"/>
+            </a:pPr>
+            <a:endParaRPr lang="en-GB" dirty="0"/>
+          </a:p>
+          <a:p>
+            <a:r>
+              <a:rPr lang="en-GB" dirty="0"/>
+              <a:t>Online Search Index gauges search behaviours related to specific economic activities. It is a composite indicator which measures the co-movement of multidimensional and dynamic search terms.</a:t>
+            </a:r>
           </a:p>
         </p:txBody>
       </p:sp>
     </p:spTree>
     <p:extLst>
       <p:ext uri="{BB962C8B-B14F-4D97-AF65-F5344CB8AC3E}">
-        <p14:creationId xmlns:p14="http://schemas.microsoft.com/office/powerpoint/2010/main" val="1444463899"/>
+        <p14:creationId xmlns:p14="http://schemas.microsoft.com/office/powerpoint/2010/main" val="3801793846"/>
       </p:ext>
     </p:extLst>
   </p:cSld>
@@ -7292,14 +7547,17 @@
           </a:bodyPr>
           <a:lstStyle/>
           <a:p>
-            <a:endParaRPr lang="en-GB" sz="2400" b="1" dirty="0">
-              <a:solidFill>
-                <a:srgbClr val="C00000"/>
-              </a:solidFill>
-              <a:latin typeface="Arial" panose="020B0604020202020204" pitchFamily="34" charset="0"/>
-              <a:ea typeface="+mn-ea"/>
-              <a:cs typeface="Arial" panose="020B0604020202020204" pitchFamily="34" charset="0"/>
-            </a:endParaRPr>
+            <a:r>
+              <a:rPr lang="en-GB" sz="2400" b="1" dirty="0">
+                <a:solidFill>
+                  <a:srgbClr val="C00000"/>
+                </a:solidFill>
+                <a:latin typeface="Arial" panose="020B0604020202020204" pitchFamily="34" charset="0"/>
+                <a:ea typeface="+mn-ea"/>
+                <a:cs typeface="Arial" panose="020B0604020202020204" pitchFamily="34" charset="0"/>
+              </a:rPr>
+              <a:t>Data</a:t>
+            </a:r>
           </a:p>
         </p:txBody>
       </p:sp>
@@ -7331,13 +7589,16 @@
           </a:bodyPr>
           <a:lstStyle/>
           <a:p>
-            <a:endParaRPr lang="en-GB" sz="1800" dirty="0">
-              <a:solidFill>
-                <a:srgbClr val="C00000"/>
-              </a:solidFill>
-              <a:latin typeface="Arial" panose="020B0604020202020204" pitchFamily="34" charset="0"/>
-              <a:cs typeface="Arial" panose="020B0604020202020204" pitchFamily="34" charset="0"/>
-            </a:endParaRPr>
+            <a:r>
+              <a:rPr lang="en-GB" sz="1800" dirty="0">
+                <a:solidFill>
+                  <a:srgbClr val="C00000"/>
+                </a:solidFill>
+                <a:latin typeface="Arial" panose="020B0604020202020204" pitchFamily="34" charset="0"/>
+                <a:cs typeface="Arial" panose="020B0604020202020204" pitchFamily="34" charset="0"/>
+              </a:rPr>
+              <a:t>Google AdWords Data </a:t>
+            </a:r>
           </a:p>
         </p:txBody>
       </p:sp>
@@ -7374,62 +7635,60 @@
               <a:buChar char="§"/>
             </a:pPr>
             <a:r>
+              <a:rPr lang="en-GB" sz="1400" dirty="0" err="1">
+                <a:solidFill>
+                  <a:srgbClr val="333333"/>
+                </a:solidFill>
+                <a:latin typeface="-apple-system"/>
+              </a:rPr>
+              <a:t>Adwords</a:t>
+            </a:r>
+            <a:r>
               <a:rPr lang="en-GB" sz="1400" dirty="0">
-                <a:latin typeface="Arial" panose="020B0604020202020204" pitchFamily="34" charset="0"/>
-                <a:cs typeface="Arial" panose="020B0604020202020204" pitchFamily="34" charset="0"/>
+                <a:solidFill>
+                  <a:srgbClr val="333333"/>
+                </a:solidFill>
+                <a:latin typeface="-apple-system"/>
               </a:rPr>
-              <a:t>Dd</a:t>
-            </a:r>
-          </a:p>
-          <a:p>
-            <a:pPr>
-              <a:buFont typeface="Wingdings" panose="05000000000000000000" pitchFamily="2" charset="2"/>
-              <a:buChar char="§"/>
-            </a:pPr>
-            <a:endParaRPr lang="en-GB" sz="1400" dirty="0">
-              <a:latin typeface="Arial" panose="020B0604020202020204" pitchFamily="34" charset="0"/>
-              <a:cs typeface="Arial" panose="020B0604020202020204" pitchFamily="34" charset="0"/>
-            </a:endParaRPr>
-          </a:p>
-          <a:p>
-            <a:pPr>
-              <a:buFont typeface="Wingdings" panose="05000000000000000000" pitchFamily="2" charset="2"/>
-              <a:buChar char="§"/>
-            </a:pPr>
-            <a:endParaRPr lang="en-GB" sz="1400" dirty="0">
-              <a:latin typeface="Arial" panose="020B0604020202020204" pitchFamily="34" charset="0"/>
-              <a:cs typeface="Arial" panose="020B0604020202020204" pitchFamily="34" charset="0"/>
-            </a:endParaRPr>
-          </a:p>
-          <a:p>
-            <a:pPr>
-              <a:buFont typeface="Wingdings" panose="05000000000000000000" pitchFamily="2" charset="2"/>
-              <a:buChar char="§"/>
-            </a:pPr>
-            <a:endParaRPr lang="en-GB" sz="1400" dirty="0">
-              <a:latin typeface="Arial" panose="020B0604020202020204" pitchFamily="34" charset="0"/>
-              <a:cs typeface="Arial" panose="020B0604020202020204" pitchFamily="34" charset="0"/>
-            </a:endParaRPr>
-          </a:p>
-          <a:p>
-            <a:pPr>
-              <a:buFont typeface="Wingdings" panose="05000000000000000000" pitchFamily="2" charset="2"/>
-              <a:buChar char="§"/>
-            </a:pPr>
-            <a:endParaRPr lang="en-GB" sz="1400" dirty="0">
-              <a:latin typeface="Arial" panose="020B0604020202020204" pitchFamily="34" charset="0"/>
-              <a:cs typeface="Arial" panose="020B0604020202020204" pitchFamily="34" charset="0"/>
-            </a:endParaRPr>
-          </a:p>
-          <a:p>
-            <a:pPr>
-              <a:buFont typeface="Wingdings" panose="05000000000000000000" pitchFamily="2" charset="2"/>
-              <a:buChar char="§"/>
-            </a:pPr>
-            <a:endParaRPr lang="en-GB" sz="1400" dirty="0">
-              <a:latin typeface="Arial" panose="020B0604020202020204" pitchFamily="34" charset="0"/>
-              <a:cs typeface="Arial" panose="020B0604020202020204" pitchFamily="34" charset="0"/>
-            </a:endParaRPr>
+              <a:t> tool </a:t>
+            </a:r>
+            <a:r>
+              <a:rPr lang="en-GB" sz="1400" dirty="0" err="1">
+                <a:solidFill>
+                  <a:srgbClr val="333333"/>
+                </a:solidFill>
+                <a:latin typeface="-apple-system"/>
+              </a:rPr>
+              <a:t>isnt</a:t>
+            </a:r>
+            <a:r>
+              <a:rPr lang="en-GB" sz="1400" dirty="0">
+                <a:solidFill>
+                  <a:srgbClr val="333333"/>
+                </a:solidFill>
+                <a:latin typeface="-apple-system"/>
+              </a:rPr>
+              <a:t> for finding the search data , but it will show how advertisers are showing interest on a specific query . Thus showing </a:t>
+            </a:r>
+            <a:r>
+              <a:rPr lang="en-GB" sz="1400" dirty="0" err="1">
+                <a:solidFill>
+                  <a:srgbClr val="333333"/>
+                </a:solidFill>
+                <a:latin typeface="-apple-system"/>
+              </a:rPr>
+              <a:t>populatity</a:t>
+            </a:r>
+            <a:r>
+              <a:rPr lang="en-GB" sz="1400" dirty="0">
+                <a:solidFill>
+                  <a:srgbClr val="333333"/>
+                </a:solidFill>
+                <a:latin typeface="-apple-system"/>
+              </a:rPr>
+              <a:t> or competitiveness of a query .</a:t>
+            </a:r>
+            <a:endParaRPr lang="en-GB" sz="1400" dirty="0"/>
           </a:p>
           <a:p>
             <a:pPr>
@@ -7561,13 +7820,16 @@
           </a:bodyPr>
           <a:lstStyle/>
           <a:p>
-            <a:endParaRPr lang="en-GB" sz="1800" dirty="0">
-              <a:solidFill>
-                <a:srgbClr val="C00000"/>
-              </a:solidFill>
-              <a:latin typeface="Arial" panose="020B0604020202020204" pitchFamily="34" charset="0"/>
-              <a:cs typeface="Arial" panose="020B0604020202020204" pitchFamily="34" charset="0"/>
-            </a:endParaRPr>
+            <a:r>
+              <a:rPr lang="en-GB" sz="1800" dirty="0">
+                <a:solidFill>
+                  <a:srgbClr val="C00000"/>
+                </a:solidFill>
+                <a:latin typeface="Arial" panose="020B0604020202020204" pitchFamily="34" charset="0"/>
+                <a:cs typeface="Arial" panose="020B0604020202020204" pitchFamily="34" charset="0"/>
+              </a:rPr>
+              <a:t>Other Sources </a:t>
+            </a:r>
           </a:p>
         </p:txBody>
       </p:sp>
@@ -7609,8 +7871,69 @@
                 <a:latin typeface="Arial" panose="020B0604020202020204" pitchFamily="34" charset="0"/>
                 <a:cs typeface="Arial" panose="020B0604020202020204" pitchFamily="34" charset="0"/>
               </a:rPr>
-              <a:t>Dd</a:t>
-            </a:r>
+              <a:t>Primitive list,</a:t>
+            </a:r>
+          </a:p>
+          <a:p>
+            <a:pPr lvl="0">
+              <a:buFont typeface="Wingdings" panose="05000000000000000000" pitchFamily="2" charset="2"/>
+              <a:buChar char="§"/>
+            </a:pPr>
+            <a:r>
+              <a:rPr lang="en-GB" sz="1400" dirty="0">
+                <a:solidFill>
+                  <a:prstClr val="black"/>
+                </a:solidFill>
+                <a:latin typeface="Arial" panose="020B0604020202020204" pitchFamily="34" charset="0"/>
+                <a:cs typeface="Arial" panose="020B0604020202020204" pitchFamily="34" charset="0"/>
+              </a:rPr>
+              <a:t>Harvard dictionary of economic keywords</a:t>
+            </a:r>
+          </a:p>
+          <a:p>
+            <a:pPr lvl="0">
+              <a:buFont typeface="Wingdings" panose="05000000000000000000" pitchFamily="2" charset="2"/>
+              <a:buChar char="§"/>
+            </a:pPr>
+            <a:r>
+              <a:rPr lang="en-GB" sz="1400" dirty="0">
+                <a:solidFill>
+                  <a:prstClr val="black"/>
+                </a:solidFill>
+                <a:latin typeface="Arial" panose="020B0604020202020204" pitchFamily="34" charset="0"/>
+                <a:cs typeface="Arial" panose="020B0604020202020204" pitchFamily="34" charset="0"/>
+              </a:rPr>
+              <a:t>Google correlate for related terms </a:t>
+            </a:r>
+          </a:p>
+          <a:p>
+            <a:pPr lvl="0">
+              <a:buFont typeface="Wingdings" panose="05000000000000000000" pitchFamily="2" charset="2"/>
+              <a:buChar char="§"/>
+            </a:pPr>
+            <a:r>
+              <a:rPr lang="en-GB" sz="1400" dirty="0">
+                <a:solidFill>
+                  <a:prstClr val="black"/>
+                </a:solidFill>
+                <a:latin typeface="Arial" panose="020B0604020202020204" pitchFamily="34" charset="0"/>
+                <a:cs typeface="Arial" panose="020B0604020202020204" pitchFamily="34" charset="0"/>
+              </a:rPr>
+              <a:t>Term filtering via correlation, Bayesian variable selection, PCA eigenvectors </a:t>
+            </a:r>
+          </a:p>
+          <a:p>
+            <a:pPr lvl="0">
+              <a:buFont typeface="Wingdings" panose="05000000000000000000" pitchFamily="2" charset="2"/>
+              <a:buChar char="§"/>
+            </a:pPr>
+            <a:endParaRPr lang="en-GB" sz="1400" dirty="0">
+              <a:solidFill>
+                <a:prstClr val="black"/>
+              </a:solidFill>
+              <a:latin typeface="Arial" panose="020B0604020202020204" pitchFamily="34" charset="0"/>
+              <a:cs typeface="Arial" panose="020B0604020202020204" pitchFamily="34" charset="0"/>
+            </a:endParaRPr>
           </a:p>
           <a:p>
             <a:pPr lvl="0">
@@ -7867,10 +8190,41 @@
           </a:p>
         </p:txBody>
       </p:sp>
+      <p:sp>
+        <p:nvSpPr>
+          <p:cNvPr id="9" name="Rectangle 8">
+            <a:extLst>
+              <a:ext uri="{FF2B5EF4-FFF2-40B4-BE49-F238E27FC236}">
+                <a16:creationId xmlns:a16="http://schemas.microsoft.com/office/drawing/2014/main" id="{82A6A96C-425B-4F2F-B034-5A07C7A20CCA}"/>
+              </a:ext>
+            </a:extLst>
+          </p:cNvPr>
+          <p:cNvSpPr/>
+          <p:nvPr/>
+        </p:nvSpPr>
+        <p:spPr>
+          <a:xfrm>
+            <a:off x="836612" y="2798068"/>
+            <a:ext cx="5157787" cy="369332"/>
+          </a:xfrm>
+          <a:prstGeom prst="rect">
+            <a:avLst/>
+          </a:prstGeom>
+        </p:spPr>
+        <p:txBody>
+          <a:bodyPr wrap="square">
+            <a:spAutoFit/>
+          </a:bodyPr>
+          <a:lstStyle/>
+          <a:p>
+            <a:endParaRPr lang="en-GB" dirty="0"/>
+          </a:p>
+        </p:txBody>
+      </p:sp>
     </p:spTree>
     <p:extLst>
       <p:ext uri="{BB962C8B-B14F-4D97-AF65-F5344CB8AC3E}">
-        <p14:creationId xmlns:p14="http://schemas.microsoft.com/office/powerpoint/2010/main" val="4095002062"/>
+        <p14:creationId xmlns:p14="http://schemas.microsoft.com/office/powerpoint/2010/main" val="1444463899"/>
       </p:ext>
     </p:extLst>
   </p:cSld>
@@ -7934,7 +8288,7 @@
                 <a:ea typeface="+mn-ea"/>
                 <a:cs typeface="Arial" panose="020B0604020202020204" pitchFamily="34" charset="0"/>
               </a:rPr>
-              <a:t>Data</a:t>
+              <a:t>Terms</a:t>
             </a:r>
           </a:p>
         </p:txBody>
@@ -7963,7 +8317,7 @@
         </p:spPr>
         <p:txBody>
           <a:bodyPr>
-            <a:normAutofit fontScale="92500"/>
+            <a:normAutofit/>
           </a:bodyPr>
           <a:lstStyle/>
           <a:p>
@@ -7975,19 +8329,8 @@
                 <a:latin typeface="Arial" panose="020B0604020202020204" pitchFamily="34" charset="0"/>
                 <a:cs typeface="Arial" panose="020B0604020202020204" pitchFamily="34" charset="0"/>
               </a:rPr>
-              <a:t>Google Processing (</a:t>
-            </a:r>
-            <a:r>
-              <a:rPr lang="en-GB" sz="1800" dirty="0"/>
-              <a:t>Choi, H. and Varian, H., 2012. Predicting the present with Google Trends)</a:t>
-            </a:r>
-            <a:endParaRPr lang="en-GB" sz="1800" dirty="0">
-              <a:solidFill>
-                <a:srgbClr val="C00000"/>
-              </a:solidFill>
-              <a:latin typeface="Arial" panose="020B0604020202020204" pitchFamily="34" charset="0"/>
-              <a:cs typeface="Arial" panose="020B0604020202020204" pitchFamily="34" charset="0"/>
-            </a:endParaRPr>
+              <a:t>Term selection</a:t>
+            </a:r>
           </a:p>
         </p:txBody>
       </p:sp>
@@ -8028,7 +8371,20 @@
                 <a:latin typeface="Arial" panose="020B0604020202020204" pitchFamily="34" charset="0"/>
                 <a:cs typeface="Arial" panose="020B0604020202020204" pitchFamily="34" charset="0"/>
               </a:rPr>
-              <a:t>provides a time series index of the volume of queries users enter into Google in a given geographic area</a:t>
+              <a:t>Terms selected from questionnaire </a:t>
+            </a:r>
+          </a:p>
+          <a:p>
+            <a:pPr lvl="1">
+              <a:buFont typeface="Wingdings" panose="05000000000000000000" pitchFamily="2" charset="2"/>
+              <a:buChar char="§"/>
+            </a:pPr>
+            <a:r>
+              <a:rPr lang="en-GB" sz="1000" dirty="0">
+                <a:latin typeface="Arial" panose="020B0604020202020204" pitchFamily="34" charset="0"/>
+                <a:cs typeface="Arial" panose="020B0604020202020204" pitchFamily="34" charset="0"/>
+              </a:rPr>
+              <a:t>Maybe from earning’s calls</a:t>
             </a:r>
           </a:p>
           <a:p>
@@ -8041,81 +8397,15 @@
                 <a:latin typeface="Arial" panose="020B0604020202020204" pitchFamily="34" charset="0"/>
                 <a:cs typeface="Arial" panose="020B0604020202020204" pitchFamily="34" charset="0"/>
               </a:rPr>
-              <a:t>t0 = 0, volume normalised to 100</a:t>
-            </a:r>
-          </a:p>
-          <a:p>
-            <a:pPr>
-              <a:buFont typeface="Wingdings" panose="05000000000000000000" pitchFamily="2" charset="2"/>
-              <a:buChar char="§"/>
-            </a:pPr>
-            <a:r>
-              <a:rPr lang="en-GB" sz="1400" dirty="0">
-                <a:latin typeface="Arial" panose="020B0604020202020204" pitchFamily="34" charset="0"/>
-                <a:cs typeface="Arial" panose="020B0604020202020204" pitchFamily="34" charset="0"/>
-              </a:rPr>
-              <a:t>Uses a sampling method to create dataset </a:t>
-            </a:r>
-          </a:p>
-          <a:p>
-            <a:pPr>
-              <a:buFont typeface="Wingdings" panose="05000000000000000000" pitchFamily="2" charset="2"/>
-              <a:buChar char="§"/>
-            </a:pPr>
-            <a:r>
-              <a:rPr lang="en-GB" sz="1400" dirty="0">
-                <a:latin typeface="Arial" panose="020B0604020202020204" pitchFamily="34" charset="0"/>
-                <a:cs typeface="Arial" panose="020B0604020202020204" pitchFamily="34" charset="0"/>
-              </a:rPr>
-              <a:t>Classification algorithms for topic / terms are probabilistic and prone to errors (apple </a:t>
-            </a:r>
-            <a:r>
-              <a:rPr lang="en-GB" sz="1400" dirty="0" err="1">
-                <a:latin typeface="Arial" panose="020B0604020202020204" pitchFamily="34" charset="0"/>
-                <a:cs typeface="Arial" panose="020B0604020202020204" pitchFamily="34" charset="0"/>
-              </a:rPr>
-              <a:t>inc</a:t>
-            </a:r>
-            <a:r>
-              <a:rPr lang="en-GB" sz="1400" dirty="0">
-                <a:latin typeface="Arial" panose="020B0604020202020204" pitchFamily="34" charset="0"/>
-                <a:cs typeface="Arial" panose="020B0604020202020204" pitchFamily="34" charset="0"/>
-              </a:rPr>
-              <a:t>)</a:t>
-            </a:r>
-          </a:p>
-          <a:p>
-            <a:pPr>
-              <a:buFont typeface="Wingdings" panose="05000000000000000000" pitchFamily="2" charset="2"/>
-              <a:buChar char="§"/>
-            </a:pPr>
-            <a:r>
-              <a:rPr lang="en-GB" sz="1400" dirty="0">
-                <a:latin typeface="Arial" panose="020B0604020202020204" pitchFamily="34" charset="0"/>
-                <a:cs typeface="Arial" panose="020B0604020202020204" pitchFamily="34" charset="0"/>
-              </a:rPr>
-              <a:t>Google Correlate for term selection</a:t>
-            </a:r>
-          </a:p>
-          <a:p>
-            <a:pPr>
-              <a:buFont typeface="Wingdings" panose="05000000000000000000" pitchFamily="2" charset="2"/>
-              <a:buChar char="§"/>
-            </a:pPr>
-            <a:r>
-              <a:rPr lang="en-GB" sz="1400" dirty="0">
-                <a:latin typeface="Arial" panose="020B0604020202020204" pitchFamily="34" charset="0"/>
-                <a:cs typeface="Arial" panose="020B0604020202020204" pitchFamily="34" charset="0"/>
-              </a:rPr>
-              <a:t>BSTS is most reliable tool for feature selection</a:t>
-            </a:r>
-          </a:p>
-          <a:p>
-            <a:pPr>
-              <a:buFont typeface="Wingdings" panose="05000000000000000000" pitchFamily="2" charset="2"/>
-              <a:buChar char="§"/>
-            </a:pPr>
-            <a:endParaRPr lang="en-GB" sz="1400" dirty="0">
+              <a:t>D</a:t>
+            </a:r>
+          </a:p>
+          <a:p>
+            <a:pPr>
+              <a:buFont typeface="Wingdings" panose="05000000000000000000" pitchFamily="2" charset="2"/>
+              <a:buChar char="§"/>
+            </a:pPr>
+            <a:endParaRPr lang="en-GB" sz="1000" dirty="0">
               <a:latin typeface="Arial" panose="020B0604020202020204" pitchFamily="34" charset="0"/>
               <a:cs typeface="Arial" panose="020B0604020202020204" pitchFamily="34" charset="0"/>
             </a:endParaRPr>
@@ -8296,46 +8586,20 @@
         </p:spPr>
         <p:txBody>
           <a:bodyPr>
-            <a:normAutofit fontScale="92500"/>
+            <a:normAutofit/>
           </a:bodyPr>
           <a:lstStyle/>
           <a:p>
             <a:r>
-              <a:rPr lang="en-GB" sz="1800" dirty="0"/>
-              <a:t>von </a:t>
-            </a:r>
-            <a:r>
-              <a:rPr lang="en-GB" sz="1800" dirty="0" err="1"/>
-              <a:t>Graevenitz</a:t>
-            </a:r>
-            <a:r>
-              <a:rPr lang="en-GB" sz="1800" dirty="0"/>
-              <a:t>, G., Helmers, C., </a:t>
-            </a:r>
-            <a:r>
-              <a:rPr lang="en-GB" sz="1800" dirty="0" err="1"/>
-              <a:t>Millot</a:t>
-            </a:r>
-            <a:r>
-              <a:rPr lang="en-GB" sz="1800" dirty="0"/>
-              <a:t>, V. and Turnbull, O., 2016. Does online search predict sales? evidence from big data for car markets in Germany and the UK.</a:t>
-            </a:r>
-            <a:endParaRPr lang="en-GB" sz="1800" dirty="0">
-              <a:solidFill>
-                <a:prstClr val="black"/>
-              </a:solidFill>
-              <a:latin typeface="Arial" panose="020B0604020202020204" pitchFamily="34" charset="0"/>
-              <a:cs typeface="Arial" panose="020B0604020202020204" pitchFamily="34" charset="0"/>
-            </a:endParaRPr>
-          </a:p>
-          <a:p>
-            <a:endParaRPr lang="en-GB" sz="1800" dirty="0">
-              <a:solidFill>
-                <a:srgbClr val="C00000"/>
-              </a:solidFill>
-              <a:latin typeface="Arial" panose="020B0604020202020204" pitchFamily="34" charset="0"/>
-              <a:cs typeface="Arial" panose="020B0604020202020204" pitchFamily="34" charset="0"/>
-            </a:endParaRPr>
+              <a:rPr lang="en-GB" sz="1800" dirty="0">
+                <a:solidFill>
+                  <a:srgbClr val="C00000"/>
+                </a:solidFill>
+                <a:latin typeface="Arial" panose="020B0604020202020204" pitchFamily="34" charset="0"/>
+                <a:cs typeface="Arial" panose="020B0604020202020204" pitchFamily="34" charset="0"/>
+              </a:rPr>
+              <a:t>Term Breakdown</a:t>
+            </a:r>
           </a:p>
         </p:txBody>
       </p:sp>
@@ -8377,7 +8641,23 @@
                 <a:latin typeface="Arial" panose="020B0604020202020204" pitchFamily="34" charset="0"/>
                 <a:cs typeface="Arial" panose="020B0604020202020204" pitchFamily="34" charset="0"/>
               </a:rPr>
-              <a:t>online searches that look identical in the available data result from different motivations that lead to different post-search </a:t>
+              <a:t>Although understanding the volume of relevant search terms can be relevant, deciphering the user’s intent may provide more insight into their likely actions </a:t>
+            </a:r>
+          </a:p>
+          <a:p>
+            <a:pPr lvl="0">
+              <a:buFont typeface="Wingdings" panose="05000000000000000000" pitchFamily="2" charset="2"/>
+              <a:buChar char="§"/>
+            </a:pPr>
+            <a:r>
+              <a:rPr lang="en-GB" sz="1400" dirty="0">
+                <a:solidFill>
+                  <a:prstClr val="black"/>
+                </a:solidFill>
+                <a:latin typeface="Arial" panose="020B0604020202020204" pitchFamily="34" charset="0"/>
+                <a:cs typeface="Arial" panose="020B0604020202020204" pitchFamily="34" charset="0"/>
+              </a:rPr>
+              <a:t>Hence using NLP to determine sentiment of query, or ranking search results according to relevance in a </a:t>
             </a:r>
             <a:r>
               <a:rPr lang="en-GB" sz="1400" dirty="0" err="1">
@@ -8387,7 +8667,7 @@
                 <a:latin typeface="Arial" panose="020B0604020202020204" pitchFamily="34" charset="0"/>
                 <a:cs typeface="Arial" panose="020B0604020202020204" pitchFamily="34" charset="0"/>
               </a:rPr>
-              <a:t>behavior</a:t>
+              <a:t>disceret</a:t>
             </a:r>
             <a:r>
               <a:rPr lang="en-GB" sz="1400" dirty="0">
@@ -8397,7 +8677,7 @@
                 <a:latin typeface="Arial" panose="020B0604020202020204" pitchFamily="34" charset="0"/>
                 <a:cs typeface="Arial" panose="020B0604020202020204" pitchFamily="34" charset="0"/>
               </a:rPr>
-              <a:t>. This</a:t>
+              <a:t> fashion may be helpful.</a:t>
             </a:r>
           </a:p>
           <a:p>
@@ -8413,17 +8693,18 @@
                 <a:latin typeface="Arial" panose="020B0604020202020204" pitchFamily="34" charset="0"/>
                 <a:cs typeface="Arial" panose="020B0604020202020204" pitchFamily="34" charset="0"/>
               </a:rPr>
-              <a:t>weekly data more </a:t>
-            </a:r>
-            <a:r>
-              <a:rPr lang="en-GB" sz="1400" dirty="0" err="1">
+              <a:t>Method 1. building features out of </a:t>
+            </a:r>
+            <a:r>
+              <a:rPr lang="en-GB" sz="1400" dirty="0">
                 <a:solidFill>
                   <a:prstClr val="black"/>
                 </a:solidFill>
                 <a:latin typeface="Arial" panose="020B0604020202020204" pitchFamily="34" charset="0"/>
                 <a:cs typeface="Arial" panose="020B0604020202020204" pitchFamily="34" charset="0"/>
+                <a:hlinkClick r:id="rId2"/>
               </a:rPr>
-              <a:t>sensistive</a:t>
+              <a:t>n-grams</a:t>
             </a:r>
             <a:r>
               <a:rPr lang="en-GB" sz="1400" dirty="0">
@@ -8433,25 +8714,8 @@
                 <a:latin typeface="Arial" panose="020B0604020202020204" pitchFamily="34" charset="0"/>
                 <a:cs typeface="Arial" panose="020B0604020202020204" pitchFamily="34" charset="0"/>
               </a:rPr>
-              <a:t> to real world </a:t>
-            </a:r>
-            <a:r>
-              <a:rPr lang="en-GB" sz="1400" dirty="0" err="1">
-                <a:solidFill>
-                  <a:prstClr val="black"/>
-                </a:solidFill>
-                <a:latin typeface="Arial" panose="020B0604020202020204" pitchFamily="34" charset="0"/>
-                <a:cs typeface="Arial" panose="020B0604020202020204" pitchFamily="34" charset="0"/>
-              </a:rPr>
-              <a:t>flactuations</a:t>
-            </a:r>
-            <a:endParaRPr lang="en-GB" sz="1400" dirty="0">
-              <a:solidFill>
-                <a:prstClr val="black"/>
-              </a:solidFill>
-              <a:latin typeface="Arial" panose="020B0604020202020204" pitchFamily="34" charset="0"/>
-              <a:cs typeface="Arial" panose="020B0604020202020204" pitchFamily="34" charset="0"/>
-            </a:endParaRPr>
+              <a:t>. Require thousands of search terms. </a:t>
+            </a:r>
           </a:p>
           <a:p>
             <a:pPr lvl="0">
@@ -8466,8 +8730,41 @@
                 <a:latin typeface="Arial" panose="020B0604020202020204" pitchFamily="34" charset="0"/>
                 <a:cs typeface="Arial" panose="020B0604020202020204" pitchFamily="34" charset="0"/>
               </a:rPr>
-              <a:t>methods for panel data analysis must evolve</a:t>
-            </a:r>
+              <a:t>Curse of dimensionality, TF-IDF threshold score for features. Random Forest can be used to avoid overfitting.</a:t>
+            </a:r>
+          </a:p>
+          <a:p>
+            <a:pPr lvl="0">
+              <a:buFont typeface="Wingdings" panose="05000000000000000000" pitchFamily="2" charset="2"/>
+              <a:buChar char="§"/>
+            </a:pPr>
+            <a:r>
+              <a:rPr lang="en-GB" sz="1400" dirty="0">
+                <a:solidFill>
+                  <a:prstClr val="black"/>
+                </a:solidFill>
+                <a:latin typeface="Arial" panose="020B0604020202020204" pitchFamily="34" charset="0"/>
+                <a:cs typeface="Arial" panose="020B0604020202020204" pitchFamily="34" charset="0"/>
+              </a:rPr>
+              <a:t>Improvements: stemming and </a:t>
+            </a:r>
+            <a:r>
+              <a:rPr lang="en-GB" sz="1400">
+                <a:solidFill>
+                  <a:prstClr val="black"/>
+                </a:solidFill>
+                <a:latin typeface="Arial" panose="020B0604020202020204" pitchFamily="34" charset="0"/>
+                <a:cs typeface="Arial" panose="020B0604020202020204" pitchFamily="34" charset="0"/>
+              </a:rPr>
+              <a:t>removing stop-words, </a:t>
+            </a:r>
+            <a:endParaRPr lang="en-GB" sz="1400" dirty="0">
+              <a:solidFill>
+                <a:prstClr val="black"/>
+              </a:solidFill>
+              <a:latin typeface="Arial" panose="020B0604020202020204" pitchFamily="34" charset="0"/>
+              <a:cs typeface="Arial" panose="020B0604020202020204" pitchFamily="34" charset="0"/>
+            </a:endParaRPr>
           </a:p>
           <a:p>
             <a:pPr lvl="0">
@@ -8727,7 +9024,7 @@
     </p:spTree>
     <p:extLst>
       <p:ext uri="{BB962C8B-B14F-4D97-AF65-F5344CB8AC3E}">
-        <p14:creationId xmlns:p14="http://schemas.microsoft.com/office/powerpoint/2010/main" val="1207621166"/>
+        <p14:creationId xmlns:p14="http://schemas.microsoft.com/office/powerpoint/2010/main" val="4095002062"/>
       </p:ext>
     </p:extLst>
   </p:cSld>
@@ -8791,7 +9088,7 @@
                 <a:ea typeface="+mn-ea"/>
                 <a:cs typeface="Arial" panose="020B0604020202020204" pitchFamily="34" charset="0"/>
               </a:rPr>
-              <a:t>Alternatives</a:t>
+              <a:t>Data</a:t>
             </a:r>
           </a:p>
         </p:txBody>
@@ -8820,7 +9117,7 @@
         </p:spPr>
         <p:txBody>
           <a:bodyPr>
-            <a:normAutofit/>
+            <a:normAutofit fontScale="92500"/>
           </a:bodyPr>
           <a:lstStyle/>
           <a:p>
@@ -8832,8 +9129,19 @@
                 <a:latin typeface="Arial" panose="020B0604020202020204" pitchFamily="34" charset="0"/>
                 <a:cs typeface="Arial" panose="020B0604020202020204" pitchFamily="34" charset="0"/>
               </a:rPr>
-              <a:t>Yandex</a:t>
-            </a:r>
+              <a:t>Google Processing (</a:t>
+            </a:r>
+            <a:r>
+              <a:rPr lang="en-GB" sz="1800" dirty="0"/>
+              <a:t>Choi, H. and Varian, H., 2012. Predicting the present with Google Trends)</a:t>
+            </a:r>
+            <a:endParaRPr lang="en-GB" sz="1800" dirty="0">
+              <a:solidFill>
+                <a:srgbClr val="C00000"/>
+              </a:solidFill>
+              <a:latin typeface="Arial" panose="020B0604020202020204" pitchFamily="34" charset="0"/>
+              <a:cs typeface="Arial" panose="020B0604020202020204" pitchFamily="34" charset="0"/>
+            </a:endParaRPr>
           </a:p>
         </p:txBody>
       </p:sp>
@@ -8874,7 +9182,7 @@
                 <a:latin typeface="Arial" panose="020B0604020202020204" pitchFamily="34" charset="0"/>
                 <a:cs typeface="Arial" panose="020B0604020202020204" pitchFamily="34" charset="0"/>
               </a:rPr>
-              <a:t>Raw search numbers </a:t>
+              <a:t>provides a time series index of the volume of queries users enter into Google in a given geographic area</a:t>
             </a:r>
           </a:p>
           <a:p>
@@ -8887,21 +9195,8 @@
                 <a:latin typeface="Arial" panose="020B0604020202020204" pitchFamily="34" charset="0"/>
                 <a:cs typeface="Arial" panose="020B0604020202020204" pitchFamily="34" charset="0"/>
               </a:rPr>
-              <a:t>Just 1 year history provided for all terms </a:t>
-            </a:r>
-          </a:p>
-          <a:p>
-            <a:pPr>
-              <a:buFont typeface="Wingdings" panose="05000000000000000000" pitchFamily="2" charset="2"/>
-              <a:buChar char="§"/>
-            </a:pPr>
-            <a:r>
-              <a:rPr lang="en-GB" sz="1400" dirty="0">
-                <a:hlinkClick r:id="rId2"/>
-              </a:rPr>
-              <a:t>https://wordstat.yandex.com/#!/history?words=oil</a:t>
-            </a:r>
-            <a:endParaRPr lang="en-GB" sz="1400" dirty="0"/>
+              <a:t>t0 = 0, volume normalised to 100</a:t>
+            </a:r>
           </a:p>
           <a:p>
             <a:pPr>
@@ -8913,15 +9208,77 @@
                 <a:latin typeface="Arial" panose="020B0604020202020204" pitchFamily="34" charset="0"/>
                 <a:cs typeface="Arial" panose="020B0604020202020204" pitchFamily="34" charset="0"/>
               </a:rPr>
-              <a:t>Lots of </a:t>
+              <a:t>Uses a sampling method to create dataset </a:t>
+            </a:r>
+          </a:p>
+          <a:p>
+            <a:pPr>
+              <a:buFont typeface="Wingdings" panose="05000000000000000000" pitchFamily="2" charset="2"/>
+              <a:buChar char="§"/>
+            </a:pPr>
+            <a:r>
+              <a:rPr lang="en-GB" sz="1400" dirty="0">
+                <a:latin typeface="Arial" panose="020B0604020202020204" pitchFamily="34" charset="0"/>
+                <a:cs typeface="Arial" panose="020B0604020202020204" pitchFamily="34" charset="0"/>
+              </a:rPr>
+              <a:t>Classification algorithms for topic / terms are probabilistic and prone to errors (apple </a:t>
             </a:r>
             <a:r>
               <a:rPr lang="en-GB" sz="1400" dirty="0" err="1">
                 <a:latin typeface="Arial" panose="020B0604020202020204" pitchFamily="34" charset="0"/>
                 <a:cs typeface="Arial" panose="020B0604020202020204" pitchFamily="34" charset="0"/>
               </a:rPr>
-              <a:t>captchta</a:t>
-            </a:r>
+              <a:t>inc</a:t>
+            </a:r>
+            <a:r>
+              <a:rPr lang="en-GB" sz="1400" dirty="0">
+                <a:latin typeface="Arial" panose="020B0604020202020204" pitchFamily="34" charset="0"/>
+                <a:cs typeface="Arial" panose="020B0604020202020204" pitchFamily="34" charset="0"/>
+              </a:rPr>
+              <a:t>)</a:t>
+            </a:r>
+          </a:p>
+          <a:p>
+            <a:pPr>
+              <a:buFont typeface="Wingdings" panose="05000000000000000000" pitchFamily="2" charset="2"/>
+              <a:buChar char="§"/>
+            </a:pPr>
+            <a:r>
+              <a:rPr lang="en-GB" sz="1400" dirty="0">
+                <a:latin typeface="Arial" panose="020B0604020202020204" pitchFamily="34" charset="0"/>
+                <a:cs typeface="Arial" panose="020B0604020202020204" pitchFamily="34" charset="0"/>
+              </a:rPr>
+              <a:t>Google Correlate for term selection</a:t>
+            </a:r>
+          </a:p>
+          <a:p>
+            <a:pPr>
+              <a:buFont typeface="Wingdings" panose="05000000000000000000" pitchFamily="2" charset="2"/>
+              <a:buChar char="§"/>
+            </a:pPr>
+            <a:r>
+              <a:rPr lang="en-GB" sz="1400" dirty="0">
+                <a:latin typeface="Arial" panose="020B0604020202020204" pitchFamily="34" charset="0"/>
+                <a:cs typeface="Arial" panose="020B0604020202020204" pitchFamily="34" charset="0"/>
+              </a:rPr>
+              <a:t>BSTS is most reliable tool for feature selection</a:t>
+            </a:r>
+          </a:p>
+          <a:p>
+            <a:pPr>
+              <a:buFont typeface="Wingdings" panose="05000000000000000000" pitchFamily="2" charset="2"/>
+              <a:buChar char="§"/>
+            </a:pPr>
+            <a:endParaRPr lang="en-GB" sz="1400" dirty="0">
+              <a:latin typeface="Arial" panose="020B0604020202020204" pitchFamily="34" charset="0"/>
+              <a:cs typeface="Arial" panose="020B0604020202020204" pitchFamily="34" charset="0"/>
+            </a:endParaRPr>
+          </a:p>
+          <a:p>
+            <a:pPr>
+              <a:buFont typeface="Wingdings" panose="05000000000000000000" pitchFamily="2" charset="2"/>
+              <a:buChar char="§"/>
+            </a:pPr>
             <a:endParaRPr lang="en-GB" sz="1400" dirty="0">
               <a:latin typeface="Arial" panose="020B0604020202020204" pitchFamily="34" charset="0"/>
               <a:cs typeface="Arial" panose="020B0604020202020204" pitchFamily="34" charset="0"/>
@@ -9093,20 +9450,46 @@
         </p:spPr>
         <p:txBody>
           <a:bodyPr>
-            <a:normAutofit/>
+            <a:normAutofit fontScale="92500"/>
           </a:bodyPr>
           <a:lstStyle/>
           <a:p>
             <a:r>
-              <a:rPr lang="en-GB" sz="1800" dirty="0">
-                <a:solidFill>
-                  <a:srgbClr val="C00000"/>
-                </a:solidFill>
-                <a:latin typeface="Arial" panose="020B0604020202020204" pitchFamily="34" charset="0"/>
-                <a:cs typeface="Arial" panose="020B0604020202020204" pitchFamily="34" charset="0"/>
-              </a:rPr>
-              <a:t>Other sources</a:t>
-            </a:r>
+              <a:rPr lang="en-GB" sz="1800" dirty="0"/>
+              <a:t>von </a:t>
+            </a:r>
+            <a:r>
+              <a:rPr lang="en-GB" sz="1800" dirty="0" err="1"/>
+              <a:t>Graevenitz</a:t>
+            </a:r>
+            <a:r>
+              <a:rPr lang="en-GB" sz="1800" dirty="0"/>
+              <a:t>, G., Helmers, C., </a:t>
+            </a:r>
+            <a:r>
+              <a:rPr lang="en-GB" sz="1800" dirty="0" err="1"/>
+              <a:t>Millot</a:t>
+            </a:r>
+            <a:r>
+              <a:rPr lang="en-GB" sz="1800" dirty="0"/>
+              <a:t>, V. and Turnbull, O., 2016. Does online search predict sales? evidence from big data for car markets in Germany and the UK.</a:t>
+            </a:r>
+            <a:endParaRPr lang="en-GB" sz="1800" dirty="0">
+              <a:solidFill>
+                <a:prstClr val="black"/>
+              </a:solidFill>
+              <a:latin typeface="Arial" panose="020B0604020202020204" pitchFamily="34" charset="0"/>
+              <a:cs typeface="Arial" panose="020B0604020202020204" pitchFamily="34" charset="0"/>
+            </a:endParaRPr>
+          </a:p>
+          <a:p>
+            <a:endParaRPr lang="en-GB" sz="1800" dirty="0">
+              <a:solidFill>
+                <a:srgbClr val="C00000"/>
+              </a:solidFill>
+              <a:latin typeface="Arial" panose="020B0604020202020204" pitchFamily="34" charset="0"/>
+              <a:cs typeface="Arial" panose="020B0604020202020204" pitchFamily="34" charset="0"/>
+            </a:endParaRPr>
           </a:p>
         </p:txBody>
       </p:sp>
@@ -9147,9 +9530,18 @@
                 </a:solidFill>
                 <a:latin typeface="Arial" panose="020B0604020202020204" pitchFamily="34" charset="0"/>
                 <a:cs typeface="Arial" panose="020B0604020202020204" pitchFamily="34" charset="0"/>
-                <a:hlinkClick r:id="rId3"/>
               </a:rPr>
-              <a:t>Several</a:t>
+              <a:t>online searches that look identical in the available data result from different motivations that lead to different post-search </a:t>
+            </a:r>
+            <a:r>
+              <a:rPr lang="en-GB" sz="1400" dirty="0" err="1">
+                <a:solidFill>
+                  <a:prstClr val="black"/>
+                </a:solidFill>
+                <a:latin typeface="Arial" panose="020B0604020202020204" pitchFamily="34" charset="0"/>
+                <a:cs typeface="Arial" panose="020B0604020202020204" pitchFamily="34" charset="0"/>
+              </a:rPr>
+              <a:t>behavior</a:t>
             </a:r>
             <a:r>
               <a:rPr lang="en-GB" sz="1400" dirty="0">
@@ -9159,8 +9551,90 @@
                 <a:latin typeface="Arial" panose="020B0604020202020204" pitchFamily="34" charset="0"/>
                 <a:cs typeface="Arial" panose="020B0604020202020204" pitchFamily="34" charset="0"/>
               </a:rPr>
-              <a:t> </a:t>
-            </a:r>
+              <a:t>. This</a:t>
+            </a:r>
+          </a:p>
+          <a:p>
+            <a:pPr lvl="0">
+              <a:buFont typeface="Wingdings" panose="05000000000000000000" pitchFamily="2" charset="2"/>
+              <a:buChar char="§"/>
+            </a:pPr>
+            <a:r>
+              <a:rPr lang="en-GB" sz="1400" dirty="0">
+                <a:solidFill>
+                  <a:prstClr val="black"/>
+                </a:solidFill>
+                <a:latin typeface="Arial" panose="020B0604020202020204" pitchFamily="34" charset="0"/>
+                <a:cs typeface="Arial" panose="020B0604020202020204" pitchFamily="34" charset="0"/>
+              </a:rPr>
+              <a:t>weekly data more </a:t>
+            </a:r>
+            <a:r>
+              <a:rPr lang="en-GB" sz="1400" dirty="0" err="1">
+                <a:solidFill>
+                  <a:prstClr val="black"/>
+                </a:solidFill>
+                <a:latin typeface="Arial" panose="020B0604020202020204" pitchFamily="34" charset="0"/>
+                <a:cs typeface="Arial" panose="020B0604020202020204" pitchFamily="34" charset="0"/>
+              </a:rPr>
+              <a:t>sensistive</a:t>
+            </a:r>
+            <a:r>
+              <a:rPr lang="en-GB" sz="1400" dirty="0">
+                <a:solidFill>
+                  <a:prstClr val="black"/>
+                </a:solidFill>
+                <a:latin typeface="Arial" panose="020B0604020202020204" pitchFamily="34" charset="0"/>
+                <a:cs typeface="Arial" panose="020B0604020202020204" pitchFamily="34" charset="0"/>
+              </a:rPr>
+              <a:t> to real world </a:t>
+            </a:r>
+            <a:r>
+              <a:rPr lang="en-GB" sz="1400" dirty="0" err="1">
+                <a:solidFill>
+                  <a:prstClr val="black"/>
+                </a:solidFill>
+                <a:latin typeface="Arial" panose="020B0604020202020204" pitchFamily="34" charset="0"/>
+                <a:cs typeface="Arial" panose="020B0604020202020204" pitchFamily="34" charset="0"/>
+              </a:rPr>
+              <a:t>flactuations</a:t>
+            </a:r>
+            <a:endParaRPr lang="en-GB" sz="1400" dirty="0">
+              <a:solidFill>
+                <a:prstClr val="black"/>
+              </a:solidFill>
+              <a:latin typeface="Arial" panose="020B0604020202020204" pitchFamily="34" charset="0"/>
+              <a:cs typeface="Arial" panose="020B0604020202020204" pitchFamily="34" charset="0"/>
+            </a:endParaRPr>
+          </a:p>
+          <a:p>
+            <a:pPr lvl="0">
+              <a:buFont typeface="Wingdings" panose="05000000000000000000" pitchFamily="2" charset="2"/>
+              <a:buChar char="§"/>
+            </a:pPr>
+            <a:r>
+              <a:rPr lang="en-GB" sz="1400" dirty="0">
+                <a:solidFill>
+                  <a:prstClr val="black"/>
+                </a:solidFill>
+                <a:latin typeface="Arial" panose="020B0604020202020204" pitchFamily="34" charset="0"/>
+                <a:cs typeface="Arial" panose="020B0604020202020204" pitchFamily="34" charset="0"/>
+              </a:rPr>
+              <a:t>methods for panel data analysis must evolve</a:t>
+            </a:r>
+          </a:p>
+          <a:p>
+            <a:pPr lvl="0">
+              <a:buFont typeface="Wingdings" panose="05000000000000000000" pitchFamily="2" charset="2"/>
+              <a:buChar char="§"/>
+            </a:pPr>
+            <a:endParaRPr lang="en-GB" sz="1400" dirty="0">
+              <a:solidFill>
+                <a:prstClr val="black"/>
+              </a:solidFill>
+              <a:latin typeface="Arial" panose="020B0604020202020204" pitchFamily="34" charset="0"/>
+              <a:cs typeface="Arial" panose="020B0604020202020204" pitchFamily="34" charset="0"/>
+            </a:endParaRPr>
           </a:p>
           <a:p>
             <a:pPr lvl="0">
@@ -9407,7 +9881,7 @@
     </p:spTree>
     <p:extLst>
       <p:ext uri="{BB962C8B-B14F-4D97-AF65-F5344CB8AC3E}">
-        <p14:creationId xmlns:p14="http://schemas.microsoft.com/office/powerpoint/2010/main" val="4119009904"/>
+        <p14:creationId xmlns:p14="http://schemas.microsoft.com/office/powerpoint/2010/main" val="1207621166"/>
       </p:ext>
     </p:extLst>
   </p:cSld>
@@ -9462,14 +9936,17 @@
           </a:bodyPr>
           <a:lstStyle/>
           <a:p>
-            <a:endParaRPr lang="en-GB" sz="2400" b="1" dirty="0">
-              <a:solidFill>
-                <a:srgbClr val="C00000"/>
-              </a:solidFill>
-              <a:latin typeface="Arial" panose="020B0604020202020204" pitchFamily="34" charset="0"/>
-              <a:ea typeface="+mn-ea"/>
-              <a:cs typeface="Arial" panose="020B0604020202020204" pitchFamily="34" charset="0"/>
-            </a:endParaRPr>
+            <a:r>
+              <a:rPr lang="en-GB" sz="2400" b="1" dirty="0">
+                <a:solidFill>
+                  <a:srgbClr val="C00000"/>
+                </a:solidFill>
+                <a:latin typeface="Arial" panose="020B0604020202020204" pitchFamily="34" charset="0"/>
+                <a:ea typeface="+mn-ea"/>
+                <a:cs typeface="Arial" panose="020B0604020202020204" pitchFamily="34" charset="0"/>
+              </a:rPr>
+              <a:t>Alternatives</a:t>
+            </a:r>
           </a:p>
         </p:txBody>
       </p:sp>
@@ -9501,13 +9978,16 @@
           </a:bodyPr>
           <a:lstStyle/>
           <a:p>
-            <a:endParaRPr lang="en-GB" sz="1800" dirty="0">
-              <a:solidFill>
-                <a:srgbClr val="C00000"/>
-              </a:solidFill>
-              <a:latin typeface="Arial" panose="020B0604020202020204" pitchFamily="34" charset="0"/>
-              <a:cs typeface="Arial" panose="020B0604020202020204" pitchFamily="34" charset="0"/>
-            </a:endParaRPr>
+            <a:r>
+              <a:rPr lang="en-GB" sz="1800" dirty="0">
+                <a:solidFill>
+                  <a:srgbClr val="C00000"/>
+                </a:solidFill>
+                <a:latin typeface="Arial" panose="020B0604020202020204" pitchFamily="34" charset="0"/>
+                <a:cs typeface="Arial" panose="020B0604020202020204" pitchFamily="34" charset="0"/>
+              </a:rPr>
+              <a:t>Yandex</a:t>
+            </a:r>
           </a:p>
         </p:txBody>
       </p:sp>
@@ -9548,14 +10028,54 @@
                 <a:latin typeface="Arial" panose="020B0604020202020204" pitchFamily="34" charset="0"/>
                 <a:cs typeface="Arial" panose="020B0604020202020204" pitchFamily="34" charset="0"/>
               </a:rPr>
-              <a:t>Dd</a:t>
-            </a:r>
-          </a:p>
-          <a:p>
-            <a:pPr>
-              <a:buFont typeface="Wingdings" panose="05000000000000000000" pitchFamily="2" charset="2"/>
-              <a:buChar char="§"/>
-            </a:pPr>
+              <a:t>Raw search numbers </a:t>
+            </a:r>
+          </a:p>
+          <a:p>
+            <a:pPr>
+              <a:buFont typeface="Wingdings" panose="05000000000000000000" pitchFamily="2" charset="2"/>
+              <a:buChar char="§"/>
+            </a:pPr>
+            <a:r>
+              <a:rPr lang="en-GB" sz="1400" dirty="0">
+                <a:latin typeface="Arial" panose="020B0604020202020204" pitchFamily="34" charset="0"/>
+                <a:cs typeface="Arial" panose="020B0604020202020204" pitchFamily="34" charset="0"/>
+              </a:rPr>
+              <a:t>Just 1 year history provided for all terms </a:t>
+            </a:r>
+          </a:p>
+          <a:p>
+            <a:pPr>
+              <a:buFont typeface="Wingdings" panose="05000000000000000000" pitchFamily="2" charset="2"/>
+              <a:buChar char="§"/>
+            </a:pPr>
+            <a:r>
+              <a:rPr lang="en-GB" sz="1400" dirty="0">
+                <a:hlinkClick r:id="rId2"/>
+              </a:rPr>
+              <a:t>https://wordstat.yandex.com/#!/history?words=oil</a:t>
+            </a:r>
+            <a:endParaRPr lang="en-GB" sz="1400" dirty="0"/>
+          </a:p>
+          <a:p>
+            <a:pPr>
+              <a:buFont typeface="Wingdings" panose="05000000000000000000" pitchFamily="2" charset="2"/>
+              <a:buChar char="§"/>
+            </a:pPr>
+            <a:r>
+              <a:rPr lang="en-GB" sz="1400" dirty="0">
+                <a:latin typeface="Arial" panose="020B0604020202020204" pitchFamily="34" charset="0"/>
+                <a:cs typeface="Arial" panose="020B0604020202020204" pitchFamily="34" charset="0"/>
+              </a:rPr>
+              <a:t>Lots of </a:t>
+            </a:r>
+            <a:r>
+              <a:rPr lang="en-GB" sz="1400" dirty="0" err="1">
+                <a:latin typeface="Arial" panose="020B0604020202020204" pitchFamily="34" charset="0"/>
+                <a:cs typeface="Arial" panose="020B0604020202020204" pitchFamily="34" charset="0"/>
+              </a:rPr>
+              <a:t>captchta</a:t>
+            </a:r>
             <a:endParaRPr lang="en-GB" sz="1400" dirty="0">
               <a:latin typeface="Arial" panose="020B0604020202020204" pitchFamily="34" charset="0"/>
               <a:cs typeface="Arial" panose="020B0604020202020204" pitchFamily="34" charset="0"/>
@@ -9731,13 +10251,16 @@
           </a:bodyPr>
           <a:lstStyle/>
           <a:p>
-            <a:endParaRPr lang="en-GB" sz="1800" dirty="0">
-              <a:solidFill>
-                <a:srgbClr val="C00000"/>
-              </a:solidFill>
-              <a:latin typeface="Arial" panose="020B0604020202020204" pitchFamily="34" charset="0"/>
-              <a:cs typeface="Arial" panose="020B0604020202020204" pitchFamily="34" charset="0"/>
-            </a:endParaRPr>
+            <a:r>
+              <a:rPr lang="en-GB" sz="1800" dirty="0">
+                <a:solidFill>
+                  <a:srgbClr val="C00000"/>
+                </a:solidFill>
+                <a:latin typeface="Arial" panose="020B0604020202020204" pitchFamily="34" charset="0"/>
+                <a:cs typeface="Arial" panose="020B0604020202020204" pitchFamily="34" charset="0"/>
+              </a:rPr>
+              <a:t>Other sources</a:t>
+            </a:r>
           </a:p>
         </p:txBody>
       </p:sp>
@@ -9778,22 +10301,20 @@
                 </a:solidFill>
                 <a:latin typeface="Arial" panose="020B0604020202020204" pitchFamily="34" charset="0"/>
                 <a:cs typeface="Arial" panose="020B0604020202020204" pitchFamily="34" charset="0"/>
+                <a:hlinkClick r:id="rId3"/>
               </a:rPr>
-              <a:t>Dd</a:t>
-            </a:r>
-          </a:p>
-          <a:p>
-            <a:pPr lvl="0">
-              <a:buFont typeface="Wingdings" panose="05000000000000000000" pitchFamily="2" charset="2"/>
-              <a:buChar char="§"/>
-            </a:pPr>
-            <a:endParaRPr lang="en-GB" sz="1400" dirty="0">
-              <a:solidFill>
-                <a:prstClr val="black"/>
-              </a:solidFill>
-              <a:latin typeface="Arial" panose="020B0604020202020204" pitchFamily="34" charset="0"/>
-              <a:cs typeface="Arial" panose="020B0604020202020204" pitchFamily="34" charset="0"/>
-            </a:endParaRPr>
+              <a:t>Several</a:t>
+            </a:r>
+            <a:r>
+              <a:rPr lang="en-GB" sz="1400" dirty="0">
+                <a:solidFill>
+                  <a:prstClr val="black"/>
+                </a:solidFill>
+                <a:latin typeface="Arial" panose="020B0604020202020204" pitchFamily="34" charset="0"/>
+                <a:cs typeface="Arial" panose="020B0604020202020204" pitchFamily="34" charset="0"/>
+              </a:rPr>
+              <a:t> </a:t>
+            </a:r>
           </a:p>
           <a:p>
             <a:pPr lvl="0">
@@ -10040,7 +10561,7 @@
     </p:spTree>
     <p:extLst>
       <p:ext uri="{BB962C8B-B14F-4D97-AF65-F5344CB8AC3E}">
-        <p14:creationId xmlns:p14="http://schemas.microsoft.com/office/powerpoint/2010/main" val="1509430587"/>
+        <p14:creationId xmlns:p14="http://schemas.microsoft.com/office/powerpoint/2010/main" val="4119009904"/>
       </p:ext>
     </p:extLst>
   </p:cSld>

</xml_diff>